<commit_message>
Matriz do diplay 7 segmentos
</commit_message>
<xml_diff>
--- a/apresentacaoDeApoioArduinoIVoluntarios.pptx
+++ b/apresentacaoDeApoioArduinoIVoluntarios.pptx
@@ -229,7 +229,7 @@
           <a:p>
             <a:fld id="{EC4A0CE6-EC9A-46CA-804D-CDF7015B8D4D}" type="datetimeFigureOut">
               <a:rPr lang="pt-BR" smtClean="0"/>
-              <a:t>10/04/2019</a:t>
+              <a:t>17/04/2019</a:t>
             </a:fld>
             <a:endParaRPr lang="pt-BR"/>
           </a:p>
@@ -4248,7 +4248,7 @@
           <a:p>
             <a:fld id="{5611C23F-353B-423E-8E0B-F1599B8055CA}" type="datetimeFigureOut">
               <a:rPr lang="pt-BR" smtClean="0"/>
-              <a:t>10/04/2019</a:t>
+              <a:t>17/04/2019</a:t>
             </a:fld>
             <a:endParaRPr lang="pt-BR"/>
           </a:p>
@@ -4418,7 +4418,7 @@
           <a:p>
             <a:fld id="{5611C23F-353B-423E-8E0B-F1599B8055CA}" type="datetimeFigureOut">
               <a:rPr lang="pt-BR" smtClean="0"/>
-              <a:t>10/04/2019</a:t>
+              <a:t>17/04/2019</a:t>
             </a:fld>
             <a:endParaRPr lang="pt-BR"/>
           </a:p>
@@ -4598,7 +4598,7 @@
           <a:p>
             <a:fld id="{5611C23F-353B-423E-8E0B-F1599B8055CA}" type="datetimeFigureOut">
               <a:rPr lang="pt-BR" smtClean="0"/>
-              <a:t>10/04/2019</a:t>
+              <a:t>17/04/2019</a:t>
             </a:fld>
             <a:endParaRPr lang="pt-BR"/>
           </a:p>
@@ -4768,7 +4768,7 @@
           <a:p>
             <a:fld id="{5611C23F-353B-423E-8E0B-F1599B8055CA}" type="datetimeFigureOut">
               <a:rPr lang="pt-BR" smtClean="0"/>
-              <a:t>10/04/2019</a:t>
+              <a:t>17/04/2019</a:t>
             </a:fld>
             <a:endParaRPr lang="pt-BR"/>
           </a:p>
@@ -5014,7 +5014,7 @@
           <a:p>
             <a:fld id="{5611C23F-353B-423E-8E0B-F1599B8055CA}" type="datetimeFigureOut">
               <a:rPr lang="pt-BR" smtClean="0"/>
-              <a:t>10/04/2019</a:t>
+              <a:t>17/04/2019</a:t>
             </a:fld>
             <a:endParaRPr lang="pt-BR"/>
           </a:p>
@@ -5302,7 +5302,7 @@
           <a:p>
             <a:fld id="{5611C23F-353B-423E-8E0B-F1599B8055CA}" type="datetimeFigureOut">
               <a:rPr lang="pt-BR" smtClean="0"/>
-              <a:t>10/04/2019</a:t>
+              <a:t>17/04/2019</a:t>
             </a:fld>
             <a:endParaRPr lang="pt-BR"/>
           </a:p>
@@ -5729,7 +5729,7 @@
           <a:p>
             <a:fld id="{5611C23F-353B-423E-8E0B-F1599B8055CA}" type="datetimeFigureOut">
               <a:rPr lang="pt-BR" smtClean="0"/>
-              <a:t>10/04/2019</a:t>
+              <a:t>17/04/2019</a:t>
             </a:fld>
             <a:endParaRPr lang="pt-BR"/>
           </a:p>
@@ -5847,7 +5847,7 @@
           <a:p>
             <a:fld id="{5611C23F-353B-423E-8E0B-F1599B8055CA}" type="datetimeFigureOut">
               <a:rPr lang="pt-BR" smtClean="0"/>
-              <a:t>10/04/2019</a:t>
+              <a:t>17/04/2019</a:t>
             </a:fld>
             <a:endParaRPr lang="pt-BR"/>
           </a:p>
@@ -5942,7 +5942,7 @@
           <a:p>
             <a:fld id="{5611C23F-353B-423E-8E0B-F1599B8055CA}" type="datetimeFigureOut">
               <a:rPr lang="pt-BR" smtClean="0"/>
-              <a:t>10/04/2019</a:t>
+              <a:t>17/04/2019</a:t>
             </a:fld>
             <a:endParaRPr lang="pt-BR"/>
           </a:p>
@@ -6219,7 +6219,7 @@
           <a:p>
             <a:fld id="{5611C23F-353B-423E-8E0B-F1599B8055CA}" type="datetimeFigureOut">
               <a:rPr lang="pt-BR" smtClean="0"/>
-              <a:t>10/04/2019</a:t>
+              <a:t>17/04/2019</a:t>
             </a:fld>
             <a:endParaRPr lang="pt-BR"/>
           </a:p>
@@ -6472,7 +6472,7 @@
           <a:p>
             <a:fld id="{5611C23F-353B-423E-8E0B-F1599B8055CA}" type="datetimeFigureOut">
               <a:rPr lang="pt-BR" smtClean="0"/>
-              <a:t>10/04/2019</a:t>
+              <a:t>17/04/2019</a:t>
             </a:fld>
             <a:endParaRPr lang="pt-BR"/>
           </a:p>
@@ -6685,7 +6685,7 @@
           <a:p>
             <a:fld id="{5611C23F-353B-423E-8E0B-F1599B8055CA}" type="datetimeFigureOut">
               <a:rPr lang="pt-BR" smtClean="0"/>
-              <a:t>10/04/2019</a:t>
+              <a:t>17/04/2019</a:t>
             </a:fld>
             <a:endParaRPr lang="pt-BR"/>
           </a:p>
@@ -11588,12 +11588,12 @@
               <a:buChar char="•"/>
             </a:pPr>
             <a:r>
-              <a:rPr lang="pt-BR" dirty="0"/>
-              <a:t>8</a:t>
-            </a:r>
-            <a:r>
               <a:rPr lang="pt-BR" dirty="0" smtClean="0"/>
-              <a:t> fios jumpers</a:t>
+              <a:t>Fios </a:t>
+            </a:r>
+            <a:r>
+              <a:rPr lang="pt-BR" dirty="0" smtClean="0"/>
+              <a:t>jumpers</a:t>
             </a:r>
             <a:endParaRPr lang="pt-BR" dirty="0"/>
           </a:p>
@@ -11652,8 +11652,8 @@
         </p:blipFill>
         <p:spPr bwMode="auto">
           <a:xfrm>
-            <a:off x="6488503" y="1084183"/>
-            <a:ext cx="1943100" cy="4152900"/>
+            <a:off x="6488502" y="1084183"/>
+            <a:ext cx="2115945" cy="4522314"/>
           </a:xfrm>
           <a:prstGeom prst="rect">
             <a:avLst/>
@@ -11693,6 +11693,13 @@
   <p:clrMapOvr>
     <a:masterClrMapping/>
   </p:clrMapOvr>
+  <p:timing>
+    <p:tnLst>
+      <p:par>
+        <p:cTn id="1" dur="indefinite" restart="never" nodeType="tmRoot"/>
+      </p:par>
+    </p:tnLst>
+  </p:timing>
 </p:sld>
 </file>
 
@@ -11778,6 +11785,13 @@
   <p:clrMapOvr>
     <a:masterClrMapping/>
   </p:clrMapOvr>
+  <p:timing>
+    <p:tnLst>
+      <p:par>
+        <p:cTn id="1" dur="indefinite" restart="never" nodeType="tmRoot"/>
+      </p:par>
+    </p:tnLst>
+  </p:timing>
 </p:sld>
 </file>
 
@@ -11887,6 +11901,13 @@
   <p:clrMapOvr>
     <a:masterClrMapping/>
   </p:clrMapOvr>
+  <p:timing>
+    <p:tnLst>
+      <p:par>
+        <p:cTn id="1" dur="indefinite" restart="never" nodeType="tmRoot"/>
+      </p:par>
+    </p:tnLst>
+  </p:timing>
 </p:sld>
 </file>
 
@@ -11996,6 +12017,13 @@
   <p:clrMapOvr>
     <a:masterClrMapping/>
   </p:clrMapOvr>
+  <p:timing>
+    <p:tnLst>
+      <p:par>
+        <p:cTn id="1" dur="indefinite" restart="never" nodeType="tmRoot"/>
+      </p:par>
+    </p:tnLst>
+  </p:timing>
 </p:sld>
 </file>
 
@@ -12164,6 +12192,13 @@
   <p:clrMapOvr>
     <a:masterClrMapping/>
   </p:clrMapOvr>
+  <p:timing>
+    <p:tnLst>
+      <p:par>
+        <p:cTn id="1" dur="indefinite" restart="never" nodeType="tmRoot"/>
+      </p:par>
+    </p:tnLst>
+  </p:timing>
 </p:sld>
 </file>
 

</xml_diff>

<commit_message>
Add display7seg and joystick
</commit_message>
<xml_diff>
--- a/apresentacaoDeApoioArduinoIVoluntarios.pptx
+++ b/apresentacaoDeApoioArduinoIVoluntarios.pptx
@@ -5,7 +5,7 @@
     <p:sldMasterId id="2147483768" r:id="rId1"/>
   </p:sldMasterIdLst>
   <p:notesMasterIdLst>
-    <p:notesMasterId r:id="rId40"/>
+    <p:notesMasterId r:id="rId37"/>
   </p:notesMasterIdLst>
   <p:sldIdLst>
     <p:sldId id="277" r:id="rId2"/>
@@ -20,32 +20,29 @@
     <p:sldId id="280" r:id="rId11"/>
     <p:sldId id="261" r:id="rId12"/>
     <p:sldId id="282" r:id="rId13"/>
-    <p:sldId id="263" r:id="rId14"/>
-    <p:sldId id="264" r:id="rId15"/>
-    <p:sldId id="284" r:id="rId16"/>
-    <p:sldId id="266" r:id="rId17"/>
-    <p:sldId id="265" r:id="rId18"/>
-    <p:sldId id="267" r:id="rId19"/>
-    <p:sldId id="298" r:id="rId20"/>
-    <p:sldId id="297" r:id="rId21"/>
-    <p:sldId id="268" r:id="rId22"/>
-    <p:sldId id="269" r:id="rId23"/>
-    <p:sldId id="283" r:id="rId24"/>
-    <p:sldId id="270" r:id="rId25"/>
-    <p:sldId id="296" r:id="rId26"/>
-    <p:sldId id="271" r:id="rId27"/>
-    <p:sldId id="288" r:id="rId28"/>
-    <p:sldId id="294" r:id="rId29"/>
-    <p:sldId id="295" r:id="rId30"/>
-    <p:sldId id="272" r:id="rId31"/>
-    <p:sldId id="273" r:id="rId32"/>
-    <p:sldId id="289" r:id="rId33"/>
-    <p:sldId id="290" r:id="rId34"/>
-    <p:sldId id="274" r:id="rId35"/>
-    <p:sldId id="275" r:id="rId36"/>
-    <p:sldId id="292" r:id="rId37"/>
-    <p:sldId id="293" r:id="rId38"/>
-    <p:sldId id="291" r:id="rId39"/>
+    <p:sldId id="264" r:id="rId14"/>
+    <p:sldId id="266" r:id="rId15"/>
+    <p:sldId id="265" r:id="rId16"/>
+    <p:sldId id="267" r:id="rId17"/>
+    <p:sldId id="298" r:id="rId18"/>
+    <p:sldId id="297" r:id="rId19"/>
+    <p:sldId id="268" r:id="rId20"/>
+    <p:sldId id="269" r:id="rId21"/>
+    <p:sldId id="283" r:id="rId22"/>
+    <p:sldId id="270" r:id="rId23"/>
+    <p:sldId id="296" r:id="rId24"/>
+    <p:sldId id="271" r:id="rId25"/>
+    <p:sldId id="288" r:id="rId26"/>
+    <p:sldId id="294" r:id="rId27"/>
+    <p:sldId id="295" r:id="rId28"/>
+    <p:sldId id="272" r:id="rId29"/>
+    <p:sldId id="273" r:id="rId30"/>
+    <p:sldId id="289" r:id="rId31"/>
+    <p:sldId id="290" r:id="rId32"/>
+    <p:sldId id="274" r:id="rId33"/>
+    <p:sldId id="275" r:id="rId34"/>
+    <p:sldId id="292" r:id="rId35"/>
+    <p:sldId id="291" r:id="rId36"/>
   </p:sldIdLst>
   <p:sldSz cx="9144000" cy="5715000" type="screen16x10"/>
   <p:notesSz cx="6858000" cy="9144000"/>
@@ -1316,10 +1313,10 @@
                 <a:ea typeface="+mn-ea"/>
                 <a:cs typeface="+mn-cs"/>
               </a:rPr>
-              <a:t>O </a:t>
-            </a:r>
-            <a:r>
-              <a:rPr lang="pt-BR" sz="1200" b="1" i="0" u="none" strike="noStrike" kern="1200" dirty="0" err="1" smtClean="0">
+              <a:t>O primeiro passo é conectar os </a:t>
+            </a:r>
+            <a:r>
+              <a:rPr lang="pt-BR" sz="1200" b="0" i="0" kern="1200" dirty="0" err="1" smtClean="0">
                 <a:solidFill>
                   <a:schemeClr val="tx1"/>
                 </a:solidFill>
@@ -1328,10 +1325,46 @@
                 <a:ea typeface="+mn-ea"/>
                 <a:cs typeface="+mn-cs"/>
               </a:rPr>
-              <a:t>ArduBlock</a:t>
-            </a:r>
-            <a:r>
-              <a:rPr lang="pt-BR" sz="1200" b="1" i="0" u="none" strike="noStrike" kern="1200" dirty="0" smtClean="0">
+              <a:t>LEDs</a:t>
+            </a:r>
+            <a:r>
+              <a:rPr lang="pt-BR" sz="1200" b="0" i="0" kern="1200" dirty="0" smtClean="0">
+                <a:solidFill>
+                  <a:schemeClr val="tx1"/>
+                </a:solidFill>
+                <a:effectLst/>
+                <a:latin typeface="+mn-lt"/>
+                <a:ea typeface="+mn-ea"/>
+                <a:cs typeface="+mn-cs"/>
+              </a:rPr>
+              <a:t> na </a:t>
+            </a:r>
+            <a:r>
+              <a:rPr lang="pt-BR" sz="1200" b="0" i="0" kern="1200" dirty="0" err="1" smtClean="0">
+                <a:solidFill>
+                  <a:schemeClr val="tx1"/>
+                </a:solidFill>
+                <a:effectLst/>
+                <a:latin typeface="+mn-lt"/>
+                <a:ea typeface="+mn-ea"/>
+                <a:cs typeface="+mn-cs"/>
+              </a:rPr>
+              <a:t>protoboard</a:t>
+            </a:r>
+            <a:r>
+              <a:rPr lang="pt-BR" sz="1200" b="0" i="0" kern="1200" dirty="0" smtClean="0">
+                <a:solidFill>
+                  <a:schemeClr val="tx1"/>
+                </a:solidFill>
+                <a:effectLst/>
+                <a:latin typeface="+mn-lt"/>
+                <a:ea typeface="+mn-ea"/>
+                <a:cs typeface="+mn-cs"/>
+              </a:rPr>
+              <a:t>. Neste caso o LED vermelho foi conectado na coluna 12 (perna menor) e na coluna 13 (perna maior)</a:t>
+            </a:r>
+            <a:r>
+              <a:rPr lang="pt-BR" sz="1200" b="0" i="0" kern="1200" baseline="0" dirty="0" smtClean="0">
                 <a:solidFill>
                   <a:schemeClr val="tx1"/>
                 </a:solidFill>
@@ -1352,10 +1385,12 @@
                 <a:ea typeface="+mn-ea"/>
                 <a:cs typeface="+mn-cs"/>
               </a:rPr>
-              <a:t>é uma interface de programação gráfica desenvolvida exclusivamente para o </a:t>
-            </a:r>
-            <a:r>
-              <a:rPr lang="pt-BR" sz="1200" b="0" i="0" kern="1200" dirty="0" err="1" smtClean="0">
+              <a:t>e o LED verde foi conectado na coluna 19 (perna menor) e na coluna 20 (perna maior).</a:t>
+            </a:r>
+          </a:p>
+          <a:p>
+            <a:r>
+              <a:rPr lang="pt-BR" sz="1200" b="0" i="0" kern="1200" dirty="0" smtClean="0">
                 <a:solidFill>
                   <a:schemeClr val="tx1"/>
                 </a:solidFill>
@@ -1364,10 +1399,10 @@
                 <a:ea typeface="+mn-ea"/>
                 <a:cs typeface="+mn-cs"/>
               </a:rPr>
-              <a:t>Arduino</a:t>
-            </a:r>
-            <a:r>
-              <a:rPr lang="pt-BR" sz="1200" b="0" i="0" kern="1200" dirty="0" smtClean="0">
+              <a:t>Agora você vai conectar a perna de cada um dos resistores de nas colunas 12 e 19 e a outra perna na linha azul (negativo) da sua </a:t>
+            </a:r>
+            <a:r>
+              <a:rPr lang="pt-BR" sz="1200" b="0" i="0" kern="1200" dirty="0" err="1" smtClean="0">
                 <a:solidFill>
                   <a:schemeClr val="tx1"/>
                 </a:solidFill>
@@ -1376,8 +1411,182 @@
                 <a:ea typeface="+mn-ea"/>
                 <a:cs typeface="+mn-cs"/>
               </a:rPr>
-              <a:t>. Assim, você não precisa se preocupar com a linguagem de programação, você apenas precisa juntar os blocos de programação e o programa irá converter os blocos em linguagem de programação. </a:t>
-            </a:r>
+              <a:t>protoboard</a:t>
+            </a:r>
+            <a:r>
+              <a:rPr lang="pt-BR" sz="1200" b="0" i="0" kern="1200" dirty="0" smtClean="0">
+                <a:solidFill>
+                  <a:schemeClr val="tx1"/>
+                </a:solidFill>
+                <a:effectLst/>
+                <a:latin typeface="+mn-lt"/>
+                <a:ea typeface="+mn-ea"/>
+                <a:cs typeface="+mn-cs"/>
+              </a:rPr>
+              <a:t>.</a:t>
+            </a:r>
+          </a:p>
+          <a:p>
+            <a:r>
+              <a:rPr lang="pt-BR" sz="1200" b="0" i="0" kern="1200" dirty="0" smtClean="0">
+                <a:solidFill>
+                  <a:schemeClr val="tx1"/>
+                </a:solidFill>
+                <a:effectLst/>
+                <a:latin typeface="+mn-lt"/>
+                <a:ea typeface="+mn-ea"/>
+                <a:cs typeface="+mn-cs"/>
+              </a:rPr>
+              <a:t>Conecte os fios jumper nas colunas 13 e 20 da </a:t>
+            </a:r>
+            <a:r>
+              <a:rPr lang="pt-BR" sz="1200" b="0" i="0" kern="1200" dirty="0" err="1" smtClean="0">
+                <a:solidFill>
+                  <a:schemeClr val="tx1"/>
+                </a:solidFill>
+                <a:effectLst/>
+                <a:latin typeface="+mn-lt"/>
+                <a:ea typeface="+mn-ea"/>
+                <a:cs typeface="+mn-cs"/>
+              </a:rPr>
+              <a:t>protoboard</a:t>
+            </a:r>
+            <a:r>
+              <a:rPr lang="pt-BR" sz="1200" b="0" i="0" kern="1200" dirty="0" smtClean="0">
+                <a:solidFill>
+                  <a:schemeClr val="tx1"/>
+                </a:solidFill>
+                <a:effectLst/>
+                <a:latin typeface="+mn-lt"/>
+                <a:ea typeface="+mn-ea"/>
+                <a:cs typeface="+mn-cs"/>
+              </a:rPr>
+              <a:t>.</a:t>
+            </a:r>
+          </a:p>
+          <a:p>
+            <a:r>
+              <a:rPr lang="pt-BR" sz="1200" b="0" i="0" kern="1200" dirty="0" smtClean="0">
+                <a:solidFill>
+                  <a:schemeClr val="tx1"/>
+                </a:solidFill>
+                <a:effectLst/>
+                <a:latin typeface="+mn-lt"/>
+                <a:ea typeface="+mn-ea"/>
+                <a:cs typeface="+mn-cs"/>
+              </a:rPr>
+              <a:t>Conecte o fio jumper preto no pino digital GND do </a:t>
+            </a:r>
+            <a:r>
+              <a:rPr lang="pt-BR" sz="1200" b="0" i="0" kern="1200" dirty="0" err="1" smtClean="0">
+                <a:solidFill>
+                  <a:schemeClr val="tx1"/>
+                </a:solidFill>
+                <a:effectLst/>
+                <a:latin typeface="+mn-lt"/>
+                <a:ea typeface="+mn-ea"/>
+                <a:cs typeface="+mn-cs"/>
+              </a:rPr>
+              <a:t>arduino</a:t>
+            </a:r>
+            <a:r>
+              <a:rPr lang="pt-BR" sz="1200" b="0" i="0" kern="1200" dirty="0" smtClean="0">
+                <a:solidFill>
+                  <a:schemeClr val="tx1"/>
+                </a:solidFill>
+                <a:effectLst/>
+                <a:latin typeface="+mn-lt"/>
+                <a:ea typeface="+mn-ea"/>
+                <a:cs typeface="+mn-cs"/>
+              </a:rPr>
+              <a:t>. Conecte o fio verde</a:t>
+            </a:r>
+            <a:r>
+              <a:rPr lang="pt-BR" sz="1200" b="0" i="0" kern="1200" baseline="0" dirty="0" smtClean="0">
+                <a:solidFill>
+                  <a:schemeClr val="tx1"/>
+                </a:solidFill>
+                <a:effectLst/>
+                <a:latin typeface="+mn-lt"/>
+                <a:ea typeface="+mn-ea"/>
+                <a:cs typeface="+mn-cs"/>
+              </a:rPr>
+              <a:t> </a:t>
+            </a:r>
+            <a:r>
+              <a:rPr lang="pt-BR" sz="1200" b="0" i="0" kern="1200" dirty="0" smtClean="0">
+                <a:solidFill>
+                  <a:schemeClr val="tx1"/>
+                </a:solidFill>
+                <a:effectLst/>
+                <a:latin typeface="+mn-lt"/>
+                <a:ea typeface="+mn-ea"/>
+                <a:cs typeface="+mn-cs"/>
+              </a:rPr>
+              <a:t>no pino digital 8 do </a:t>
+            </a:r>
+            <a:r>
+              <a:rPr lang="pt-BR" sz="1200" b="0" i="0" kern="1200" dirty="0" err="1" smtClean="0">
+                <a:solidFill>
+                  <a:schemeClr val="tx1"/>
+                </a:solidFill>
+                <a:effectLst/>
+                <a:latin typeface="+mn-lt"/>
+                <a:ea typeface="+mn-ea"/>
+                <a:cs typeface="+mn-cs"/>
+              </a:rPr>
+              <a:t>arduino</a:t>
+            </a:r>
+            <a:r>
+              <a:rPr lang="pt-BR" sz="1200" b="0" i="0" kern="1200" baseline="0" dirty="0" smtClean="0">
+                <a:solidFill>
+                  <a:schemeClr val="tx1"/>
+                </a:solidFill>
+                <a:effectLst/>
+                <a:latin typeface="+mn-lt"/>
+                <a:ea typeface="+mn-ea"/>
+                <a:cs typeface="+mn-cs"/>
+              </a:rPr>
+              <a:t> </a:t>
+            </a:r>
+            <a:r>
+              <a:rPr lang="pt-BR" sz="1200" b="0" i="0" kern="1200" dirty="0" smtClean="0">
+                <a:solidFill>
+                  <a:schemeClr val="tx1"/>
+                </a:solidFill>
+                <a:effectLst/>
+                <a:latin typeface="+mn-lt"/>
+                <a:ea typeface="+mn-ea"/>
+                <a:cs typeface="+mn-cs"/>
+              </a:rPr>
+              <a:t>e o vermelho no pino digital 10 do </a:t>
+            </a:r>
+            <a:r>
+              <a:rPr lang="pt-BR" sz="1200" b="0" i="0" kern="1200" dirty="0" err="1" smtClean="0">
+                <a:solidFill>
+                  <a:schemeClr val="tx1"/>
+                </a:solidFill>
+                <a:effectLst/>
+                <a:latin typeface="+mn-lt"/>
+                <a:ea typeface="+mn-ea"/>
+                <a:cs typeface="+mn-cs"/>
+              </a:rPr>
+              <a:t>arduino</a:t>
+            </a:r>
+            <a:r>
+              <a:rPr lang="pt-BR" sz="1200" b="0" i="0" kern="1200" dirty="0" smtClean="0">
+                <a:solidFill>
+                  <a:schemeClr val="tx1"/>
+                </a:solidFill>
+                <a:effectLst/>
+                <a:latin typeface="+mn-lt"/>
+                <a:ea typeface="+mn-ea"/>
+                <a:cs typeface="+mn-cs"/>
+              </a:rPr>
+              <a:t>.</a:t>
+            </a:r>
+          </a:p>
+          <a:p>
             <a:endParaRPr lang="pt-BR" dirty="0"/>
           </a:p>
         </p:txBody>
@@ -1408,7 +1617,7 @@
     </p:spTree>
     <p:extLst>
       <p:ext uri="{BB962C8B-B14F-4D97-AF65-F5344CB8AC3E}">
-        <p14:creationId xmlns:p14="http://schemas.microsoft.com/office/powerpoint/2010/main" val="2269722430"/>
+        <p14:creationId xmlns:p14="http://schemas.microsoft.com/office/powerpoint/2010/main" val="3084719315"/>
       </p:ext>
     </p:extLst>
   </p:cSld>
@@ -1463,289 +1672,17 @@
           <a:lstStyle/>
           <a:p>
             <a:r>
-              <a:rPr lang="pt-BR" sz="1200" b="0" i="0" kern="1200" dirty="0" smtClean="0">
-                <a:solidFill>
-                  <a:schemeClr val="tx1"/>
-                </a:solidFill>
-                <a:effectLst/>
-                <a:latin typeface="+mn-lt"/>
-                <a:ea typeface="+mn-ea"/>
-                <a:cs typeface="+mn-cs"/>
-              </a:rPr>
-              <a:t>O primeiro passo é conectar os </a:t>
-            </a:r>
-            <a:r>
-              <a:rPr lang="pt-BR" sz="1200" b="0" i="0" kern="1200" dirty="0" err="1" smtClean="0">
-                <a:solidFill>
-                  <a:schemeClr val="tx1"/>
-                </a:solidFill>
-                <a:effectLst/>
-                <a:latin typeface="+mn-lt"/>
-                <a:ea typeface="+mn-ea"/>
-                <a:cs typeface="+mn-cs"/>
-              </a:rPr>
-              <a:t>LEDs</a:t>
-            </a:r>
-            <a:r>
-              <a:rPr lang="pt-BR" sz="1200" b="0" i="0" kern="1200" dirty="0" smtClean="0">
-                <a:solidFill>
-                  <a:schemeClr val="tx1"/>
-                </a:solidFill>
-                <a:effectLst/>
-                <a:latin typeface="+mn-lt"/>
-                <a:ea typeface="+mn-ea"/>
-                <a:cs typeface="+mn-cs"/>
-              </a:rPr>
-              <a:t> na </a:t>
-            </a:r>
-            <a:r>
-              <a:rPr lang="pt-BR" sz="1200" b="0" i="0" kern="1200" dirty="0" err="1" smtClean="0">
-                <a:solidFill>
-                  <a:schemeClr val="tx1"/>
-                </a:solidFill>
-                <a:effectLst/>
-                <a:latin typeface="+mn-lt"/>
-                <a:ea typeface="+mn-ea"/>
-                <a:cs typeface="+mn-cs"/>
-              </a:rPr>
-              <a:t>protoboard</a:t>
-            </a:r>
-            <a:r>
-              <a:rPr lang="pt-BR" sz="1200" b="0" i="0" kern="1200" dirty="0" smtClean="0">
-                <a:solidFill>
-                  <a:schemeClr val="tx1"/>
-                </a:solidFill>
-                <a:effectLst/>
-                <a:latin typeface="+mn-lt"/>
-                <a:ea typeface="+mn-ea"/>
-                <a:cs typeface="+mn-cs"/>
-              </a:rPr>
-              <a:t>. Neste caso o LED vermelho foi conectado na coluna 12 (perna menor) e na coluna 13 (perna maior)</a:t>
-            </a:r>
-            <a:r>
-              <a:rPr lang="pt-BR" sz="1200" b="0" i="0" kern="1200" baseline="0" dirty="0" smtClean="0">
-                <a:solidFill>
-                  <a:schemeClr val="tx1"/>
-                </a:solidFill>
-                <a:effectLst/>
-                <a:latin typeface="+mn-lt"/>
-                <a:ea typeface="+mn-ea"/>
-                <a:cs typeface="+mn-cs"/>
-              </a:rPr>
-              <a:t> </a:t>
-            </a:r>
-            <a:r>
-              <a:rPr lang="pt-BR" sz="1200" b="0" i="0" kern="1200" dirty="0" smtClean="0">
-                <a:solidFill>
-                  <a:schemeClr val="tx1"/>
-                </a:solidFill>
-                <a:effectLst/>
-                <a:latin typeface="+mn-lt"/>
-                <a:ea typeface="+mn-ea"/>
-                <a:cs typeface="+mn-cs"/>
-              </a:rPr>
-              <a:t>e o LED verde foi conectado na coluna 19 (perna menor) e na coluna 20 (perna maior).</a:t>
-            </a:r>
-          </a:p>
-          <a:p>
-            <a:r>
-              <a:rPr lang="pt-BR" sz="1200" b="0" i="0" kern="1200" dirty="0" smtClean="0">
-                <a:solidFill>
-                  <a:schemeClr val="tx1"/>
-                </a:solidFill>
-                <a:effectLst/>
-                <a:latin typeface="+mn-lt"/>
-                <a:ea typeface="+mn-ea"/>
-                <a:cs typeface="+mn-cs"/>
-              </a:rPr>
-              <a:t>Agora você vai conectar a perna de cada um dos resistores de nas colunas 12 e 19 e a outra perna na linha azul (negativo) da sua </a:t>
-            </a:r>
-            <a:r>
-              <a:rPr lang="pt-BR" sz="1200" b="0" i="0" kern="1200" dirty="0" err="1" smtClean="0">
-                <a:solidFill>
-                  <a:schemeClr val="tx1"/>
-                </a:solidFill>
-                <a:effectLst/>
-                <a:latin typeface="+mn-lt"/>
-                <a:ea typeface="+mn-ea"/>
-                <a:cs typeface="+mn-cs"/>
-              </a:rPr>
-              <a:t>protoboard</a:t>
-            </a:r>
-            <a:r>
-              <a:rPr lang="pt-BR" sz="1200" b="0" i="0" kern="1200" dirty="0" smtClean="0">
-                <a:solidFill>
-                  <a:schemeClr val="tx1"/>
-                </a:solidFill>
-                <a:effectLst/>
-                <a:latin typeface="+mn-lt"/>
-                <a:ea typeface="+mn-ea"/>
-                <a:cs typeface="+mn-cs"/>
-              </a:rPr>
-              <a:t>.</a:t>
-            </a:r>
-          </a:p>
-          <a:p>
-            <a:r>
-              <a:rPr lang="pt-BR" sz="1200" b="0" i="0" kern="1200" dirty="0" smtClean="0">
-                <a:solidFill>
-                  <a:schemeClr val="tx1"/>
-                </a:solidFill>
-                <a:effectLst/>
-                <a:latin typeface="+mn-lt"/>
-                <a:ea typeface="+mn-ea"/>
-                <a:cs typeface="+mn-cs"/>
-              </a:rPr>
-              <a:t>Conecte os fios jumper nas colunas 13 e 20 da </a:t>
-            </a:r>
-            <a:r>
-              <a:rPr lang="pt-BR" sz="1200" b="0" i="0" kern="1200" dirty="0" err="1" smtClean="0">
-                <a:solidFill>
-                  <a:schemeClr val="tx1"/>
-                </a:solidFill>
-                <a:effectLst/>
-                <a:latin typeface="+mn-lt"/>
-                <a:ea typeface="+mn-ea"/>
-                <a:cs typeface="+mn-cs"/>
-              </a:rPr>
-              <a:t>protoboard</a:t>
-            </a:r>
-            <a:r>
-              <a:rPr lang="pt-BR" sz="1200" b="0" i="0" kern="1200" dirty="0" smtClean="0">
-                <a:solidFill>
-                  <a:schemeClr val="tx1"/>
-                </a:solidFill>
-                <a:effectLst/>
-                <a:latin typeface="+mn-lt"/>
-                <a:ea typeface="+mn-ea"/>
-                <a:cs typeface="+mn-cs"/>
-              </a:rPr>
-              <a:t>.</a:t>
-            </a:r>
-          </a:p>
-          <a:p>
-            <a:r>
-              <a:rPr lang="pt-BR" sz="1200" b="0" i="0" kern="1200" dirty="0" smtClean="0">
-                <a:solidFill>
-                  <a:schemeClr val="tx1"/>
-                </a:solidFill>
-                <a:effectLst/>
-                <a:latin typeface="+mn-lt"/>
-                <a:ea typeface="+mn-ea"/>
-                <a:cs typeface="+mn-cs"/>
-              </a:rPr>
-              <a:t>Conecte o fio jumper preto no pino digital GND do </a:t>
-            </a:r>
-            <a:r>
-              <a:rPr lang="pt-BR" sz="1200" b="0" i="0" kern="1200" dirty="0" err="1" smtClean="0">
-                <a:solidFill>
-                  <a:schemeClr val="tx1"/>
-                </a:solidFill>
-                <a:effectLst/>
-                <a:latin typeface="+mn-lt"/>
-                <a:ea typeface="+mn-ea"/>
-                <a:cs typeface="+mn-cs"/>
-              </a:rPr>
-              <a:t>arduino</a:t>
-            </a:r>
-            <a:r>
-              <a:rPr lang="pt-BR" sz="1200" b="0" i="0" kern="1200" dirty="0" smtClean="0">
-                <a:solidFill>
-                  <a:schemeClr val="tx1"/>
-                </a:solidFill>
-                <a:effectLst/>
-                <a:latin typeface="+mn-lt"/>
-                <a:ea typeface="+mn-ea"/>
-                <a:cs typeface="+mn-cs"/>
-              </a:rPr>
-              <a:t>. Conecte o fio verde</a:t>
-            </a:r>
-            <a:r>
-              <a:rPr lang="pt-BR" sz="1200" b="0" i="0" kern="1200" baseline="0" dirty="0" smtClean="0">
-                <a:solidFill>
-                  <a:schemeClr val="tx1"/>
-                </a:solidFill>
-                <a:effectLst/>
-                <a:latin typeface="+mn-lt"/>
-                <a:ea typeface="+mn-ea"/>
-                <a:cs typeface="+mn-cs"/>
-              </a:rPr>
-              <a:t> </a:t>
-            </a:r>
-            <a:r>
-              <a:rPr lang="pt-BR" sz="1200" b="0" i="0" kern="1200" dirty="0" smtClean="0">
-                <a:solidFill>
-                  <a:schemeClr val="tx1"/>
-                </a:solidFill>
-                <a:effectLst/>
-                <a:latin typeface="+mn-lt"/>
-                <a:ea typeface="+mn-ea"/>
-                <a:cs typeface="+mn-cs"/>
-              </a:rPr>
-              <a:t>no pino digital 8 do </a:t>
-            </a:r>
-            <a:r>
-              <a:rPr lang="pt-BR" sz="1200" b="0" i="0" kern="1200" dirty="0" err="1" smtClean="0">
-                <a:solidFill>
-                  <a:schemeClr val="tx1"/>
-                </a:solidFill>
-                <a:effectLst/>
-                <a:latin typeface="+mn-lt"/>
-                <a:ea typeface="+mn-ea"/>
-                <a:cs typeface="+mn-cs"/>
-              </a:rPr>
-              <a:t>arduino</a:t>
-            </a:r>
-            <a:r>
-              <a:rPr lang="pt-BR" sz="1200" b="0" i="0" kern="1200" baseline="0" dirty="0" smtClean="0">
-                <a:solidFill>
-                  <a:schemeClr val="tx1"/>
-                </a:solidFill>
-                <a:effectLst/>
-                <a:latin typeface="+mn-lt"/>
-                <a:ea typeface="+mn-ea"/>
-                <a:cs typeface="+mn-cs"/>
-              </a:rPr>
-              <a:t> </a:t>
-            </a:r>
-            <a:r>
-              <a:rPr lang="pt-BR" sz="1200" b="0" i="0" kern="1200" dirty="0" smtClean="0">
-                <a:solidFill>
-                  <a:schemeClr val="tx1"/>
-                </a:solidFill>
-                <a:effectLst/>
-                <a:latin typeface="+mn-lt"/>
-                <a:ea typeface="+mn-ea"/>
-                <a:cs typeface="+mn-cs"/>
-              </a:rPr>
-              <a:t>e o vermelho no pino digital 10 do </a:t>
-            </a:r>
-            <a:r>
-              <a:rPr lang="pt-BR" sz="1200" b="0" i="0" kern="1200" dirty="0" err="1" smtClean="0">
-                <a:solidFill>
-                  <a:schemeClr val="tx1"/>
-                </a:solidFill>
-                <a:effectLst/>
-                <a:latin typeface="+mn-lt"/>
-                <a:ea typeface="+mn-ea"/>
-                <a:cs typeface="+mn-cs"/>
-              </a:rPr>
-              <a:t>arduino</a:t>
-            </a:r>
-            <a:r>
-              <a:rPr lang="pt-BR" sz="1200" b="0" i="0" kern="1200" dirty="0" smtClean="0">
-                <a:solidFill>
-                  <a:schemeClr val="tx1"/>
-                </a:solidFill>
-                <a:effectLst/>
-                <a:latin typeface="+mn-lt"/>
-                <a:ea typeface="+mn-ea"/>
-                <a:cs typeface="+mn-cs"/>
-              </a:rPr>
-              <a:t>.</a:t>
-            </a:r>
-          </a:p>
-          <a:p>
+              <a:rPr lang="pt-BR" dirty="0" smtClean="0"/>
+              <a:t>Código</a:t>
+            </a:r>
+            <a:r>
+              <a:rPr lang="pt-BR" baseline="0" dirty="0" smtClean="0"/>
+              <a:t> gerado pelo </a:t>
+            </a:r>
+            <a:r>
+              <a:rPr lang="pt-BR" baseline="0" dirty="0" err="1" smtClean="0"/>
+              <a:t>ArduBlock</a:t>
+            </a:r>
             <a:endParaRPr lang="pt-BR" dirty="0"/>
           </a:p>
         </p:txBody>
@@ -1776,7 +1713,7 @@
     </p:spTree>
     <p:extLst>
       <p:ext uri="{BB962C8B-B14F-4D97-AF65-F5344CB8AC3E}">
-        <p14:creationId xmlns:p14="http://schemas.microsoft.com/office/powerpoint/2010/main" val="3084719315"/>
+        <p14:creationId xmlns:p14="http://schemas.microsoft.com/office/powerpoint/2010/main" val="4268222930"/>
       </p:ext>
     </p:extLst>
   </p:cSld>
@@ -1831,75 +1768,42 @@
           <a:lstStyle/>
           <a:p>
             <a:r>
-              <a:rPr lang="pt-BR" dirty="0" smtClean="0"/>
-              <a:t>Vamos</a:t>
-            </a:r>
-            <a:r>
-              <a:rPr lang="pt-BR" baseline="0" dirty="0" smtClean="0"/>
-              <a:t> montar o código do semáforo no </a:t>
-            </a:r>
-            <a:r>
-              <a:rPr lang="pt-BR" baseline="0" dirty="0" err="1" smtClean="0"/>
+              <a:rPr lang="pt-BR" sz="1200" b="0" i="0" kern="1200" dirty="0" smtClean="0">
+                <a:solidFill>
+                  <a:schemeClr val="tx1"/>
+                </a:solidFill>
+                <a:effectLst/>
+                <a:latin typeface="+mn-lt"/>
+                <a:ea typeface="+mn-ea"/>
+                <a:cs typeface="+mn-cs"/>
+              </a:rPr>
+              <a:t>Código</a:t>
+            </a:r>
+            <a:r>
+              <a:rPr lang="pt-BR" sz="1200" b="0" i="0" kern="1200" baseline="0" dirty="0" smtClean="0">
+                <a:solidFill>
+                  <a:schemeClr val="tx1"/>
+                </a:solidFill>
+                <a:effectLst/>
+                <a:latin typeface="+mn-lt"/>
+                <a:ea typeface="+mn-ea"/>
+                <a:cs typeface="+mn-cs"/>
+              </a:rPr>
+              <a:t> que faz a mesma programação sem utilizar o </a:t>
+            </a:r>
+            <a:r>
+              <a:rPr lang="pt-BR" sz="1200" b="0" i="0" kern="1200" baseline="0" dirty="0" err="1" smtClean="0">
+                <a:solidFill>
+                  <a:schemeClr val="tx1"/>
+                </a:solidFill>
+                <a:effectLst/>
+                <a:latin typeface="+mn-lt"/>
+                <a:ea typeface="+mn-ea"/>
+                <a:cs typeface="+mn-cs"/>
+              </a:rPr>
               <a:t>ArduBlock</a:t>
             </a:r>
-            <a:r>
-              <a:rPr lang="pt-BR" baseline="0" dirty="0" smtClean="0"/>
-              <a:t>, basta arrastar os componentes que estão à esquerda para a área direita. Nesse caso, o código precisa acender o LED verde por 4 segundos, apagar, acender o LED vermelho por 4 segundos e apagar.</a:t>
-            </a:r>
-          </a:p>
-          <a:p>
-            <a:r>
-              <a:rPr lang="pt-BR" baseline="0" dirty="0" smtClean="0"/>
-              <a:t>Para preparar o loop: Clique em “Controle” e arraste o bloco “sempre”. </a:t>
-            </a:r>
-          </a:p>
-          <a:p>
-            <a:r>
-              <a:rPr lang="pt-BR" baseline="0" dirty="0" smtClean="0"/>
-              <a:t>Para acender o LED verde por 4 segundos: Clique em “Pinos” e arraste “seta pino digital”, encaixe no bloco “sempre” e selecione o pino D8. Depois, clique em “Controle” e arraste “</a:t>
-            </a:r>
-            <a:r>
-              <a:rPr lang="pt-BR" baseline="0" dirty="0" err="1" smtClean="0"/>
-              <a:t>delay</a:t>
-            </a:r>
-            <a:r>
-              <a:rPr lang="pt-BR" baseline="0" dirty="0" smtClean="0"/>
-              <a:t> MILLIS </a:t>
-            </a:r>
-            <a:r>
-              <a:rPr lang="pt-BR" baseline="0" dirty="0" err="1" smtClean="0"/>
-              <a:t>milisegundos</a:t>
-            </a:r>
-            <a:r>
-              <a:rPr lang="pt-BR" baseline="0" dirty="0" smtClean="0"/>
-              <a:t>” e digite 4000.</a:t>
-            </a:r>
-          </a:p>
-          <a:p>
-            <a:r>
-              <a:rPr lang="pt-BR" baseline="0" dirty="0" smtClean="0"/>
-              <a:t>Para apagar o LED verde: Clique em “Pinos” e arraste “seta pino digital”, encaixe no bloco “sempre”, selecione o pino D8 e a opção BAIXO.</a:t>
-            </a:r>
-          </a:p>
-          <a:p>
-            <a:r>
-              <a:rPr lang="pt-BR" baseline="0" dirty="0" smtClean="0"/>
-              <a:t>Repita o mesmo processo para o LED vermelho que está no pino digital 10.</a:t>
-            </a:r>
-          </a:p>
-          <a:p>
-            <a:r>
-              <a:rPr lang="pt-BR" baseline="0" dirty="0" smtClean="0"/>
-              <a:t>No final, clique em “Enviar para o </a:t>
-            </a:r>
-            <a:r>
-              <a:rPr lang="pt-BR" baseline="0" dirty="0" err="1" smtClean="0"/>
-              <a:t>Arduino</a:t>
-            </a:r>
-            <a:r>
-              <a:rPr lang="pt-BR" baseline="0" dirty="0" smtClean="0"/>
-              <a:t>”.</a:t>
-            </a:r>
+            <a:endParaRPr lang="pt-BR" dirty="0"/>
           </a:p>
         </p:txBody>
       </p:sp>
@@ -1985,16 +1889,10 @@
           <a:p>
             <a:r>
               <a:rPr lang="pt-BR" dirty="0" smtClean="0"/>
-              <a:t>Código</a:t>
-            </a:r>
-            <a:r>
-              <a:rPr lang="pt-BR" baseline="0" dirty="0" smtClean="0"/>
-              <a:t> gerado pelo </a:t>
-            </a:r>
-            <a:r>
-              <a:rPr lang="pt-BR" baseline="0" dirty="0" err="1" smtClean="0"/>
-              <a:t>ArduBlock</a:t>
-            </a:r>
+              <a:t>Botão: um pequeno botão com 4 pinos (todos entram em contato quando o botão é pressionado). Quando o botão é apertado, os contatos entre os terminais de cada lado são ligados entre si.</a:t>
+            </a:r>
+          </a:p>
+          <a:p>
             <a:endParaRPr lang="pt-BR" dirty="0"/>
           </a:p>
         </p:txBody>
@@ -2016,7 +1914,7 @@
           <a:p>
             <a:fld id="{FC3D6F94-60CB-40AD-B487-8AAA2521EEA5}" type="slidenum">
               <a:rPr lang="pt-BR" smtClean="0"/>
-              <a:t>16</a:t>
+              <a:t>19</a:t>
             </a:fld>
             <a:endParaRPr lang="pt-BR"/>
           </a:p>
@@ -2025,7 +1923,7 @@
     </p:spTree>
     <p:extLst>
       <p:ext uri="{BB962C8B-B14F-4D97-AF65-F5344CB8AC3E}">
-        <p14:creationId xmlns:p14="http://schemas.microsoft.com/office/powerpoint/2010/main" val="4268222930"/>
+        <p14:creationId xmlns:p14="http://schemas.microsoft.com/office/powerpoint/2010/main" val="2379677251"/>
       </p:ext>
     </p:extLst>
   </p:cSld>
@@ -2080,40 +1978,8 @@
           <a:lstStyle/>
           <a:p>
             <a:r>
-              <a:rPr lang="pt-BR" sz="1200" b="0" i="0" kern="1200" dirty="0" smtClean="0">
-                <a:solidFill>
-                  <a:schemeClr val="tx1"/>
-                </a:solidFill>
-                <a:effectLst/>
-                <a:latin typeface="+mn-lt"/>
-                <a:ea typeface="+mn-ea"/>
-                <a:cs typeface="+mn-cs"/>
-              </a:rPr>
-              <a:t>Código</a:t>
-            </a:r>
-            <a:r>
-              <a:rPr lang="pt-BR" sz="1200" b="0" i="0" kern="1200" baseline="0" dirty="0" smtClean="0">
-                <a:solidFill>
-                  <a:schemeClr val="tx1"/>
-                </a:solidFill>
-                <a:effectLst/>
-                <a:latin typeface="+mn-lt"/>
-                <a:ea typeface="+mn-ea"/>
-                <a:cs typeface="+mn-cs"/>
-              </a:rPr>
-              <a:t> que faz a mesma programação sem utilizar o </a:t>
-            </a:r>
-            <a:r>
-              <a:rPr lang="pt-BR" sz="1200" b="0" i="0" kern="1200" baseline="0" dirty="0" err="1" smtClean="0">
-                <a:solidFill>
-                  <a:schemeClr val="tx1"/>
-                </a:solidFill>
-                <a:effectLst/>
-                <a:latin typeface="+mn-lt"/>
-                <a:ea typeface="+mn-ea"/>
-                <a:cs typeface="+mn-cs"/>
-              </a:rPr>
-              <a:t>ArduBlock</a:t>
+              <a:rPr lang="pt-BR" dirty="0" smtClean="0"/>
+              <a:t>Definição de variáveis</a:t>
             </a:r>
             <a:endParaRPr lang="pt-BR" dirty="0"/>
           </a:p>
@@ -2136,7 +2002,7 @@
           <a:p>
             <a:fld id="{FC3D6F94-60CB-40AD-B487-8AAA2521EEA5}" type="slidenum">
               <a:rPr lang="pt-BR" smtClean="0"/>
-              <a:t>17</a:t>
+              <a:t>21</a:t>
             </a:fld>
             <a:endParaRPr lang="pt-BR"/>
           </a:p>
@@ -2145,7 +2011,7 @@
     </p:spTree>
     <p:extLst>
       <p:ext uri="{BB962C8B-B14F-4D97-AF65-F5344CB8AC3E}">
-        <p14:creationId xmlns:p14="http://schemas.microsoft.com/office/powerpoint/2010/main" val="2589246444"/>
+        <p14:creationId xmlns:p14="http://schemas.microsoft.com/office/powerpoint/2010/main" val="504453002"/>
       </p:ext>
     </p:extLst>
   </p:cSld>
@@ -2200,11 +2066,120 @@
           <a:lstStyle/>
           <a:p>
             <a:r>
+              <a:rPr lang="pt-BR" sz="1200" b="0" i="0" kern="1200" dirty="0" smtClean="0">
+                <a:solidFill>
+                  <a:schemeClr val="tx1"/>
+                </a:solidFill>
+                <a:effectLst/>
+                <a:latin typeface="+mn-lt"/>
+                <a:ea typeface="+mn-ea"/>
+                <a:cs typeface="+mn-cs"/>
+              </a:rPr>
+              <a:t>O </a:t>
+            </a:r>
+            <a:r>
+              <a:rPr lang="pt-BR" sz="1200" b="1" i="0" kern="1200" dirty="0" smtClean="0">
+                <a:solidFill>
+                  <a:schemeClr val="tx1"/>
+                </a:solidFill>
+                <a:effectLst/>
+                <a:latin typeface="+mn-lt"/>
+                <a:ea typeface="+mn-ea"/>
+                <a:cs typeface="+mn-cs"/>
+              </a:rPr>
+              <a:t>Sensor</a:t>
+            </a:r>
+            <a:r>
+              <a:rPr lang="pt-BR" sz="1200" b="0" i="0" kern="1200" dirty="0" smtClean="0">
+                <a:solidFill>
+                  <a:schemeClr val="tx1"/>
+                </a:solidFill>
+                <a:effectLst/>
+                <a:latin typeface="+mn-lt"/>
+                <a:ea typeface="+mn-ea"/>
+                <a:cs typeface="+mn-cs"/>
+              </a:rPr>
+              <a:t> ultrassônico </a:t>
+            </a:r>
+            <a:r>
+              <a:rPr lang="pt-BR" sz="1200" b="1" i="0" kern="1200" dirty="0" smtClean="0">
+                <a:solidFill>
+                  <a:schemeClr val="tx1"/>
+                </a:solidFill>
+                <a:effectLst/>
+                <a:latin typeface="+mn-lt"/>
+                <a:ea typeface="+mn-ea"/>
+                <a:cs typeface="+mn-cs"/>
+              </a:rPr>
+              <a:t>HC</a:t>
+            </a:r>
+            <a:r>
+              <a:rPr lang="pt-BR" sz="1200" b="0" i="0" kern="1200" dirty="0" smtClean="0">
+                <a:solidFill>
+                  <a:schemeClr val="tx1"/>
+                </a:solidFill>
+                <a:effectLst/>
+                <a:latin typeface="+mn-lt"/>
+                <a:ea typeface="+mn-ea"/>
+                <a:cs typeface="+mn-cs"/>
+              </a:rPr>
+              <a:t>-</a:t>
+            </a:r>
+            <a:r>
+              <a:rPr lang="pt-BR" sz="1200" b="1" i="0" kern="1200" dirty="0" smtClean="0">
+                <a:solidFill>
+                  <a:schemeClr val="tx1"/>
+                </a:solidFill>
+                <a:effectLst/>
+                <a:latin typeface="+mn-lt"/>
+                <a:ea typeface="+mn-ea"/>
+                <a:cs typeface="+mn-cs"/>
+              </a:rPr>
+              <a:t>SR04</a:t>
+            </a:r>
+            <a:r>
+              <a:rPr lang="pt-BR" sz="1200" b="0" i="0" kern="1200" dirty="0" smtClean="0">
+                <a:solidFill>
+                  <a:schemeClr val="tx1"/>
+                </a:solidFill>
+                <a:effectLst/>
+                <a:latin typeface="+mn-lt"/>
+                <a:ea typeface="+mn-ea"/>
+                <a:cs typeface="+mn-cs"/>
+              </a:rPr>
+              <a:t> é capaz de medir distâncias de 2cm a 4m com ótima precisão e baixo preço. Este módulo possui um circuito pronto com emissor e receptor acoplados e 4 pinos (VCC, Trigger, ECHO, GND) para medição.</a:t>
+            </a:r>
+            <a:endParaRPr lang="pt-BR" dirty="0" smtClean="0"/>
+          </a:p>
+          <a:p>
+            <a:r>
               <a:rPr lang="pt-BR" dirty="0" smtClean="0"/>
-              <a:t>Botão: um pequeno botão com 4 pinos (todos entram em contato quando o botão é pressionado). Quando o botão é apertado, os contatos entre os terminais de cada lado são ligados entre si.</a:t>
-            </a:r>
-          </a:p>
-          <a:p>
+              <a:t>O </a:t>
+            </a:r>
+            <a:r>
+              <a:rPr lang="pt-BR" dirty="0" err="1" smtClean="0"/>
+              <a:t>Buzzer</a:t>
+            </a:r>
+            <a:r>
+              <a:rPr lang="pt-BR" dirty="0" smtClean="0"/>
+              <a:t> é um pequeno alto-falante que não consegue tocar músicas em boa definição, mas consegue fazer apitos soarem, como sirenes ou alarmes. Quando alimentado por uma fonte oscilante, componentes metálicos internos vibram, produzindo assim um som. O </a:t>
+            </a:r>
+            <a:r>
+              <a:rPr lang="pt-BR" dirty="0" err="1" smtClean="0"/>
+              <a:t>Buzzer</a:t>
+            </a:r>
+            <a:r>
+              <a:rPr lang="pt-BR" dirty="0" smtClean="0"/>
+              <a:t> tem polaridade,  marcado por um sinal de positivo (+). Este sinal mostra onde está o pino positivo do componente. Sempre ligue este a uma saída digital do </a:t>
+            </a:r>
+            <a:r>
+              <a:rPr lang="pt-BR" dirty="0" err="1" smtClean="0"/>
+              <a:t>Arduino</a:t>
+            </a:r>
+            <a:r>
+              <a:rPr lang="pt-BR" dirty="0" smtClean="0"/>
+              <a:t> e o outro em GND. </a:t>
+            </a:r>
             <a:endParaRPr lang="pt-BR" dirty="0"/>
           </a:p>
         </p:txBody>
@@ -2226,7 +2201,7 @@
           <a:p>
             <a:fld id="{FC3D6F94-60CB-40AD-B487-8AAA2521EEA5}" type="slidenum">
               <a:rPr lang="pt-BR" smtClean="0"/>
-              <a:t>21</a:t>
+              <a:t>22</a:t>
             </a:fld>
             <a:endParaRPr lang="pt-BR"/>
           </a:p>
@@ -2235,7 +2210,7 @@
     </p:spTree>
     <p:extLst>
       <p:ext uri="{BB962C8B-B14F-4D97-AF65-F5344CB8AC3E}">
-        <p14:creationId xmlns:p14="http://schemas.microsoft.com/office/powerpoint/2010/main" val="2379677251"/>
+        <p14:creationId xmlns:p14="http://schemas.microsoft.com/office/powerpoint/2010/main" val="1626210904"/>
       </p:ext>
     </p:extLst>
   </p:cSld>
@@ -2290,8 +2265,140 @@
           <a:lstStyle/>
           <a:p>
             <a:r>
-              <a:rPr lang="pt-BR" dirty="0" smtClean="0"/>
-              <a:t>Definição de variáveis</a:t>
+              <a:rPr lang="pt-BR" sz="1200" b="0" i="0" kern="1200" dirty="0" smtClean="0">
+                <a:solidFill>
+                  <a:schemeClr val="tx1"/>
+                </a:solidFill>
+                <a:effectLst/>
+                <a:latin typeface="+mn-lt"/>
+                <a:ea typeface="+mn-ea"/>
+                <a:cs typeface="+mn-cs"/>
+              </a:rPr>
+              <a:t>O funcionamento do </a:t>
+            </a:r>
+            <a:r>
+              <a:rPr lang="pt-BR" sz="1200" b="0" i="0" u="none" strike="noStrike" kern="1200" dirty="0" smtClean="0">
+                <a:solidFill>
+                  <a:schemeClr val="tx1"/>
+                </a:solidFill>
+                <a:effectLst/>
+                <a:latin typeface="+mn-lt"/>
+                <a:ea typeface="+mn-ea"/>
+                <a:cs typeface="+mn-cs"/>
+                <a:hlinkClick r:id="rId3"/>
+              </a:rPr>
+              <a:t>HC-SR04</a:t>
+            </a:r>
+            <a:r>
+              <a:rPr lang="pt-BR" sz="1200" b="0" i="0" kern="1200" dirty="0" smtClean="0">
+                <a:solidFill>
+                  <a:schemeClr val="tx1"/>
+                </a:solidFill>
+                <a:effectLst/>
+                <a:latin typeface="+mn-lt"/>
+                <a:ea typeface="+mn-ea"/>
+                <a:cs typeface="+mn-cs"/>
+              </a:rPr>
+              <a:t> (</a:t>
+            </a:r>
+            <a:r>
+              <a:rPr lang="pt-BR" sz="1200" b="0" i="0" u="none" strike="noStrike" kern="1200" dirty="0" err="1" smtClean="0">
+                <a:solidFill>
+                  <a:schemeClr val="tx1"/>
+                </a:solidFill>
+                <a:effectLst/>
+                <a:latin typeface="+mn-lt"/>
+                <a:ea typeface="+mn-ea"/>
+                <a:cs typeface="+mn-cs"/>
+                <a:hlinkClick r:id="rId4"/>
+              </a:rPr>
+              <a:t>datasheet</a:t>
+            </a:r>
+            <a:r>
+              <a:rPr lang="pt-BR" sz="1200" b="0" i="0" kern="1200" dirty="0" smtClean="0">
+                <a:solidFill>
+                  <a:schemeClr val="tx1"/>
+                </a:solidFill>
+                <a:effectLst/>
+                <a:latin typeface="+mn-lt"/>
+                <a:ea typeface="+mn-ea"/>
+                <a:cs typeface="+mn-cs"/>
+              </a:rPr>
+              <a:t>) se baseia no envio de sinais ultrassônicos pelo sensor, que aguarda o retorno (</a:t>
+            </a:r>
+            <a:r>
+              <a:rPr lang="pt-BR" sz="1200" b="1" i="0" kern="1200" dirty="0" err="1" smtClean="0">
+                <a:solidFill>
+                  <a:schemeClr val="tx1"/>
+                </a:solidFill>
+                <a:effectLst/>
+                <a:latin typeface="+mn-lt"/>
+                <a:ea typeface="+mn-ea"/>
+                <a:cs typeface="+mn-cs"/>
+              </a:rPr>
+              <a:t>echo</a:t>
+            </a:r>
+            <a:r>
+              <a:rPr lang="pt-BR" sz="1200" b="0" i="0" kern="1200" dirty="0" smtClean="0">
+                <a:solidFill>
+                  <a:schemeClr val="tx1"/>
+                </a:solidFill>
+                <a:effectLst/>
+                <a:latin typeface="+mn-lt"/>
+                <a:ea typeface="+mn-ea"/>
+                <a:cs typeface="+mn-cs"/>
+              </a:rPr>
+              <a:t>) do sinal, e com base no tempo entre envio e retorno, calcula a distância entre o sensor e o objeto detectado.</a:t>
+            </a:r>
+          </a:p>
+          <a:p>
+            <a:r>
+              <a:rPr lang="pt-BR" sz="1200" b="0" i="0" kern="1200" dirty="0" smtClean="0">
+                <a:solidFill>
+                  <a:schemeClr val="tx1"/>
+                </a:solidFill>
+                <a:effectLst/>
+                <a:latin typeface="+mn-lt"/>
+                <a:ea typeface="+mn-ea"/>
+                <a:cs typeface="+mn-cs"/>
+              </a:rPr>
+              <a:t>Primeiramente é enviado um pulso de 10µs, indicando o início da transmissão de dados. Depois disso, são enviado 8 pulsos de 40 KHz e o sensor então aguarda o retorno (em nível alto/high), para determinar a distância entre o sensor e o objeto, utilizando a equação </a:t>
+            </a:r>
+            <a:r>
+              <a:rPr lang="pt-BR" sz="1200" b="1" i="1" kern="1200" dirty="0" smtClean="0">
+                <a:solidFill>
+                  <a:schemeClr val="tx1"/>
+                </a:solidFill>
+                <a:effectLst/>
+                <a:latin typeface="+mn-lt"/>
+                <a:ea typeface="+mn-ea"/>
+                <a:cs typeface="+mn-cs"/>
+              </a:rPr>
+              <a:t>Distância = (Tempo </a:t>
+            </a:r>
+            <a:r>
+              <a:rPr lang="pt-BR" sz="1200" b="1" i="1" kern="1200" dirty="0" err="1" smtClean="0">
+                <a:solidFill>
+                  <a:schemeClr val="tx1"/>
+                </a:solidFill>
+                <a:effectLst/>
+                <a:latin typeface="+mn-lt"/>
+                <a:ea typeface="+mn-ea"/>
+                <a:cs typeface="+mn-cs"/>
+              </a:rPr>
+              <a:t>echo</a:t>
+            </a:r>
+            <a:r>
+              <a:rPr lang="pt-BR" sz="1200" b="1" i="1" kern="1200" dirty="0" smtClean="0">
+                <a:solidFill>
+                  <a:schemeClr val="tx1"/>
+                </a:solidFill>
+                <a:effectLst/>
+                <a:latin typeface="+mn-lt"/>
+                <a:ea typeface="+mn-ea"/>
+                <a:cs typeface="+mn-cs"/>
+              </a:rPr>
+              <a:t> em nível alto * velocidade do som) /2</a:t>
             </a:r>
             <a:endParaRPr lang="pt-BR" dirty="0"/>
           </a:p>
@@ -2323,7 +2430,7 @@
     </p:spTree>
     <p:extLst>
       <p:ext uri="{BB962C8B-B14F-4D97-AF65-F5344CB8AC3E}">
-        <p14:creationId xmlns:p14="http://schemas.microsoft.com/office/powerpoint/2010/main" val="504453002"/>
+        <p14:creationId xmlns:p14="http://schemas.microsoft.com/office/powerpoint/2010/main" val="1626210904"/>
       </p:ext>
     </p:extLst>
   </p:cSld>
@@ -2399,7 +2506,7 @@
                 <a:ea typeface="+mn-ea"/>
                 <a:cs typeface="+mn-cs"/>
               </a:rPr>
-              <a:t>Sensor</a:t>
+              <a:t>display de 7 segmentos</a:t>
             </a:r>
             <a:r>
               <a:rPr lang="pt-BR" sz="1200" b="0" i="0" kern="1200" dirty="0" smtClean="0">
@@ -2411,10 +2518,10 @@
                 <a:ea typeface="+mn-ea"/>
                 <a:cs typeface="+mn-cs"/>
               </a:rPr>
-              <a:t> ultrassônico </a:t>
-            </a:r>
-            <a:r>
-              <a:rPr lang="pt-BR" sz="1200" b="1" i="0" kern="1200" dirty="0" smtClean="0">
+              <a:t>, como o próprio nome diz, tem 7 partes, ou segmentos, que podem ser agrupados de modo a formar números e letras. Os segmentos são organizados de A </a:t>
+            </a:r>
+            <a:r>
+              <a:rPr lang="pt-BR" sz="1200" b="0" i="0" kern="1200" dirty="0" err="1" smtClean="0">
                 <a:solidFill>
                   <a:schemeClr val="tx1"/>
                 </a:solidFill>
@@ -2423,7 +2530,7 @@
                 <a:ea typeface="+mn-ea"/>
                 <a:cs typeface="+mn-cs"/>
               </a:rPr>
-              <a:t>HC</a:t>
+              <a:t>a</a:t>
             </a:r>
             <a:r>
               <a:rPr lang="pt-BR" sz="1200" b="0" i="0" kern="1200" dirty="0" smtClean="0">
@@ -2435,10 +2542,10 @@
                 <a:ea typeface="+mn-ea"/>
                 <a:cs typeface="+mn-cs"/>
               </a:rPr>
-              <a:t>-</a:t>
-            </a:r>
-            <a:r>
-              <a:rPr lang="pt-BR" sz="1200" b="1" i="0" kern="1200" dirty="0" smtClean="0">
+              <a:t> F.</a:t>
+            </a:r>
+            <a:r>
+              <a:rPr lang="pt-BR" sz="1200" b="0" i="0" kern="1200" baseline="0" dirty="0" smtClean="0">
                 <a:solidFill>
                   <a:schemeClr val="tx1"/>
                 </a:solidFill>
@@ -2447,7 +2554,7 @@
                 <a:ea typeface="+mn-ea"/>
                 <a:cs typeface="+mn-cs"/>
               </a:rPr>
-              <a:t>SR04</a:t>
+              <a:t> </a:t>
             </a:r>
             <a:r>
               <a:rPr lang="pt-BR" sz="1200" b="0" i="0" kern="1200" dirty="0" smtClean="0">
@@ -2459,39 +2566,15 @@
                 <a:ea typeface="+mn-ea"/>
                 <a:cs typeface="+mn-cs"/>
               </a:rPr>
-              <a:t> é capaz de medir distâncias de 2cm a 4m com ótima precisão e baixo preço. Este módulo possui um circuito pronto com emissor e receptor acoplados e 4 pinos (VCC, Trigger, ECHO, GND) para medição.</a:t>
-            </a:r>
-            <a:endParaRPr lang="pt-BR" dirty="0" smtClean="0"/>
-          </a:p>
-          <a:p>
+              <a:t>Assim, se você quiser mostrar o número 1, basta ativar os segmentos B e C. Para mostrar o número 3, os segmentos A, B, C, D e G, e assim por diante.</a:t>
+            </a:r>
             <a:r>
               <a:rPr lang="pt-BR" dirty="0" smtClean="0"/>
-              <a:t>O </a:t>
-            </a:r>
-            <a:r>
-              <a:rPr lang="pt-BR" dirty="0" err="1" smtClean="0"/>
-              <a:t>Buzzer</a:t>
-            </a:r>
-            <a:r>
+              <a:t/>
+            </a:r>
+            <a:br>
               <a:rPr lang="pt-BR" dirty="0" smtClean="0"/>
-              <a:t> é um pequeno alto-falante que não consegue tocar músicas em boa definição, mas consegue fazer apitos soarem, como sirenes ou alarmes. Quando alimentado por uma fonte oscilante, componentes metálicos internos vibram, produzindo assim um som. O </a:t>
-            </a:r>
-            <a:r>
-              <a:rPr lang="pt-BR" dirty="0" err="1" smtClean="0"/>
-              <a:t>Buzzer</a:t>
-            </a:r>
-            <a:r>
-              <a:rPr lang="pt-BR" dirty="0" smtClean="0"/>
-              <a:t> tem polaridade,  marcado por um sinal de positivo (+). Este sinal mostra onde está o pino positivo do componente. Sempre ligue este a uma saída digital do </a:t>
-            </a:r>
-            <a:r>
-              <a:rPr lang="pt-BR" dirty="0" err="1" smtClean="0"/>
-              <a:t>Arduino</a:t>
-            </a:r>
-            <a:r>
-              <a:rPr lang="pt-BR" dirty="0" smtClean="0"/>
-              <a:t> e o outro em GND. </a:t>
-            </a:r>
+            </a:br>
             <a:endParaRPr lang="pt-BR" dirty="0"/>
           </a:p>
         </p:txBody>
@@ -2513,7 +2596,7 @@
           <a:p>
             <a:fld id="{FC3D6F94-60CB-40AD-B487-8AAA2521EEA5}" type="slidenum">
               <a:rPr lang="pt-BR" smtClean="0"/>
-              <a:t>24</a:t>
+              <a:t>28</a:t>
             </a:fld>
             <a:endParaRPr lang="pt-BR"/>
           </a:p>
@@ -2522,7 +2605,7 @@
     </p:spTree>
     <p:extLst>
       <p:ext uri="{BB962C8B-B14F-4D97-AF65-F5344CB8AC3E}">
-        <p14:creationId xmlns:p14="http://schemas.microsoft.com/office/powerpoint/2010/main" val="1626210904"/>
+        <p14:creationId xmlns:p14="http://schemas.microsoft.com/office/powerpoint/2010/main" val="4159830138"/>
       </p:ext>
     </p:extLst>
   </p:cSld>
@@ -2653,401 +2736,6 @@
     <p:extLst>
       <p:ext uri="{BB962C8B-B14F-4D97-AF65-F5344CB8AC3E}">
         <p14:creationId xmlns:p14="http://schemas.microsoft.com/office/powerpoint/2010/main" val="2125654080"/>
-      </p:ext>
-    </p:extLst>
-  </p:cSld>
-  <p:clrMapOvr>
-    <a:masterClrMapping/>
-  </p:clrMapOvr>
-</p:notes>
-</file>
-
-<file path=ppt/notesSlides/notesSlide20.xml><?xml version="1.0" encoding="utf-8"?>
-<p:notes xmlns:a="http://schemas.openxmlformats.org/drawingml/2006/main" xmlns:r="http://schemas.openxmlformats.org/officeDocument/2006/relationships" xmlns:p="http://schemas.openxmlformats.org/presentationml/2006/main">
-  <p:cSld>
-    <p:spTree>
-      <p:nvGrpSpPr>
-        <p:cNvPr id="1" name=""/>
-        <p:cNvGrpSpPr/>
-        <p:nvPr/>
-      </p:nvGrpSpPr>
-      <p:grpSpPr>
-        <a:xfrm>
-          <a:off x="0" y="0"/>
-          <a:ext cx="0" cy="0"/>
-          <a:chOff x="0" y="0"/>
-          <a:chExt cx="0" cy="0"/>
-        </a:xfrm>
-      </p:grpSpPr>
-      <p:sp>
-        <p:nvSpPr>
-          <p:cNvPr id="2" name="Espaço Reservado para Imagem de Slide 1"/>
-          <p:cNvSpPr>
-            <a:spLocks noGrp="1" noRot="1" noChangeAspect="1"/>
-          </p:cNvSpPr>
-          <p:nvPr>
-            <p:ph type="sldImg"/>
-          </p:nvPr>
-        </p:nvSpPr>
-        <p:spPr/>
-      </p:sp>
-      <p:sp>
-        <p:nvSpPr>
-          <p:cNvPr id="3" name="Espaço Reservado para Anotações 2"/>
-          <p:cNvSpPr>
-            <a:spLocks noGrp="1"/>
-          </p:cNvSpPr>
-          <p:nvPr>
-            <p:ph type="body" idx="1"/>
-          </p:nvPr>
-        </p:nvSpPr>
-        <p:spPr/>
-        <p:txBody>
-          <a:bodyPr/>
-          <a:lstStyle/>
-          <a:p>
-            <a:r>
-              <a:rPr lang="pt-BR" sz="1200" b="0" i="0" kern="1200" dirty="0" smtClean="0">
-                <a:solidFill>
-                  <a:schemeClr val="tx1"/>
-                </a:solidFill>
-                <a:effectLst/>
-                <a:latin typeface="+mn-lt"/>
-                <a:ea typeface="+mn-ea"/>
-                <a:cs typeface="+mn-cs"/>
-              </a:rPr>
-              <a:t>O funcionamento do </a:t>
-            </a:r>
-            <a:r>
-              <a:rPr lang="pt-BR" sz="1200" b="0" i="0" u="none" strike="noStrike" kern="1200" dirty="0" smtClean="0">
-                <a:solidFill>
-                  <a:schemeClr val="tx1"/>
-                </a:solidFill>
-                <a:effectLst/>
-                <a:latin typeface="+mn-lt"/>
-                <a:ea typeface="+mn-ea"/>
-                <a:cs typeface="+mn-cs"/>
-                <a:hlinkClick r:id="rId3"/>
-              </a:rPr>
-              <a:t>HC-SR04</a:t>
-            </a:r>
-            <a:r>
-              <a:rPr lang="pt-BR" sz="1200" b="0" i="0" kern="1200" dirty="0" smtClean="0">
-                <a:solidFill>
-                  <a:schemeClr val="tx1"/>
-                </a:solidFill>
-                <a:effectLst/>
-                <a:latin typeface="+mn-lt"/>
-                <a:ea typeface="+mn-ea"/>
-                <a:cs typeface="+mn-cs"/>
-              </a:rPr>
-              <a:t> (</a:t>
-            </a:r>
-            <a:r>
-              <a:rPr lang="pt-BR" sz="1200" b="0" i="0" u="none" strike="noStrike" kern="1200" dirty="0" err="1" smtClean="0">
-                <a:solidFill>
-                  <a:schemeClr val="tx1"/>
-                </a:solidFill>
-                <a:effectLst/>
-                <a:latin typeface="+mn-lt"/>
-                <a:ea typeface="+mn-ea"/>
-                <a:cs typeface="+mn-cs"/>
-                <a:hlinkClick r:id="rId4"/>
-              </a:rPr>
-              <a:t>datasheet</a:t>
-            </a:r>
-            <a:r>
-              <a:rPr lang="pt-BR" sz="1200" b="0" i="0" kern="1200" dirty="0" smtClean="0">
-                <a:solidFill>
-                  <a:schemeClr val="tx1"/>
-                </a:solidFill>
-                <a:effectLst/>
-                <a:latin typeface="+mn-lt"/>
-                <a:ea typeface="+mn-ea"/>
-                <a:cs typeface="+mn-cs"/>
-              </a:rPr>
-              <a:t>) se baseia no envio de sinais ultrassônicos pelo sensor, que aguarda o retorno (</a:t>
-            </a:r>
-            <a:r>
-              <a:rPr lang="pt-BR" sz="1200" b="1" i="0" kern="1200" dirty="0" err="1" smtClean="0">
-                <a:solidFill>
-                  <a:schemeClr val="tx1"/>
-                </a:solidFill>
-                <a:effectLst/>
-                <a:latin typeface="+mn-lt"/>
-                <a:ea typeface="+mn-ea"/>
-                <a:cs typeface="+mn-cs"/>
-              </a:rPr>
-              <a:t>echo</a:t>
-            </a:r>
-            <a:r>
-              <a:rPr lang="pt-BR" sz="1200" b="0" i="0" kern="1200" dirty="0" smtClean="0">
-                <a:solidFill>
-                  <a:schemeClr val="tx1"/>
-                </a:solidFill>
-                <a:effectLst/>
-                <a:latin typeface="+mn-lt"/>
-                <a:ea typeface="+mn-ea"/>
-                <a:cs typeface="+mn-cs"/>
-              </a:rPr>
-              <a:t>) do sinal, e com base no tempo entre envio e retorno, calcula a distância entre o sensor e o objeto detectado.</a:t>
-            </a:r>
-          </a:p>
-          <a:p>
-            <a:r>
-              <a:rPr lang="pt-BR" sz="1200" b="0" i="0" kern="1200" dirty="0" smtClean="0">
-                <a:solidFill>
-                  <a:schemeClr val="tx1"/>
-                </a:solidFill>
-                <a:effectLst/>
-                <a:latin typeface="+mn-lt"/>
-                <a:ea typeface="+mn-ea"/>
-                <a:cs typeface="+mn-cs"/>
-              </a:rPr>
-              <a:t>Primeiramente é enviado um pulso de 10µs, indicando o início da transmissão de dados. Depois disso, são enviado 8 pulsos de 40 KHz e o sensor então aguarda o retorno (em nível alto/high), para determinar a distância entre o sensor e o objeto, utilizando a equação </a:t>
-            </a:r>
-            <a:r>
-              <a:rPr lang="pt-BR" sz="1200" b="1" i="1" kern="1200" dirty="0" smtClean="0">
-                <a:solidFill>
-                  <a:schemeClr val="tx1"/>
-                </a:solidFill>
-                <a:effectLst/>
-                <a:latin typeface="+mn-lt"/>
-                <a:ea typeface="+mn-ea"/>
-                <a:cs typeface="+mn-cs"/>
-              </a:rPr>
-              <a:t>Distância = (Tempo </a:t>
-            </a:r>
-            <a:r>
-              <a:rPr lang="pt-BR" sz="1200" b="1" i="1" kern="1200" dirty="0" err="1" smtClean="0">
-                <a:solidFill>
-                  <a:schemeClr val="tx1"/>
-                </a:solidFill>
-                <a:effectLst/>
-                <a:latin typeface="+mn-lt"/>
-                <a:ea typeface="+mn-ea"/>
-                <a:cs typeface="+mn-cs"/>
-              </a:rPr>
-              <a:t>echo</a:t>
-            </a:r>
-            <a:r>
-              <a:rPr lang="pt-BR" sz="1200" b="1" i="1" kern="1200" dirty="0" smtClean="0">
-                <a:solidFill>
-                  <a:schemeClr val="tx1"/>
-                </a:solidFill>
-                <a:effectLst/>
-                <a:latin typeface="+mn-lt"/>
-                <a:ea typeface="+mn-ea"/>
-                <a:cs typeface="+mn-cs"/>
-              </a:rPr>
-              <a:t> em nível alto * velocidade do som) /2</a:t>
-            </a:r>
-            <a:endParaRPr lang="pt-BR" dirty="0"/>
-          </a:p>
-        </p:txBody>
-      </p:sp>
-      <p:sp>
-        <p:nvSpPr>
-          <p:cNvPr id="4" name="Espaço Reservado para Número de Slide 3"/>
-          <p:cNvSpPr>
-            <a:spLocks noGrp="1"/>
-          </p:cNvSpPr>
-          <p:nvPr>
-            <p:ph type="sldNum" sz="quarter" idx="10"/>
-          </p:nvPr>
-        </p:nvSpPr>
-        <p:spPr/>
-        <p:txBody>
-          <a:bodyPr/>
-          <a:lstStyle/>
-          <a:p>
-            <a:fld id="{FC3D6F94-60CB-40AD-B487-8AAA2521EEA5}" type="slidenum">
-              <a:rPr lang="pt-BR" smtClean="0"/>
-              <a:t>25</a:t>
-            </a:fld>
-            <a:endParaRPr lang="pt-BR"/>
-          </a:p>
-        </p:txBody>
-      </p:sp>
-    </p:spTree>
-    <p:extLst>
-      <p:ext uri="{BB962C8B-B14F-4D97-AF65-F5344CB8AC3E}">
-        <p14:creationId xmlns:p14="http://schemas.microsoft.com/office/powerpoint/2010/main" val="1626210904"/>
-      </p:ext>
-    </p:extLst>
-  </p:cSld>
-  <p:clrMapOvr>
-    <a:masterClrMapping/>
-  </p:clrMapOvr>
-</p:notes>
-</file>
-
-<file path=ppt/notesSlides/notesSlide21.xml><?xml version="1.0" encoding="utf-8"?>
-<p:notes xmlns:a="http://schemas.openxmlformats.org/drawingml/2006/main" xmlns:r="http://schemas.openxmlformats.org/officeDocument/2006/relationships" xmlns:p="http://schemas.openxmlformats.org/presentationml/2006/main">
-  <p:cSld>
-    <p:spTree>
-      <p:nvGrpSpPr>
-        <p:cNvPr id="1" name=""/>
-        <p:cNvGrpSpPr/>
-        <p:nvPr/>
-      </p:nvGrpSpPr>
-      <p:grpSpPr>
-        <a:xfrm>
-          <a:off x="0" y="0"/>
-          <a:ext cx="0" cy="0"/>
-          <a:chOff x="0" y="0"/>
-          <a:chExt cx="0" cy="0"/>
-        </a:xfrm>
-      </p:grpSpPr>
-      <p:sp>
-        <p:nvSpPr>
-          <p:cNvPr id="2" name="Espaço Reservado para Imagem de Slide 1"/>
-          <p:cNvSpPr>
-            <a:spLocks noGrp="1" noRot="1" noChangeAspect="1"/>
-          </p:cNvSpPr>
-          <p:nvPr>
-            <p:ph type="sldImg"/>
-          </p:nvPr>
-        </p:nvSpPr>
-        <p:spPr/>
-      </p:sp>
-      <p:sp>
-        <p:nvSpPr>
-          <p:cNvPr id="3" name="Espaço Reservado para Anotações 2"/>
-          <p:cNvSpPr>
-            <a:spLocks noGrp="1"/>
-          </p:cNvSpPr>
-          <p:nvPr>
-            <p:ph type="body" idx="1"/>
-          </p:nvPr>
-        </p:nvSpPr>
-        <p:spPr/>
-        <p:txBody>
-          <a:bodyPr/>
-          <a:lstStyle/>
-          <a:p>
-            <a:r>
-              <a:rPr lang="pt-BR" sz="1200" b="0" i="0" kern="1200" dirty="0" smtClean="0">
-                <a:solidFill>
-                  <a:schemeClr val="tx1"/>
-                </a:solidFill>
-                <a:effectLst/>
-                <a:latin typeface="+mn-lt"/>
-                <a:ea typeface="+mn-ea"/>
-                <a:cs typeface="+mn-cs"/>
-              </a:rPr>
-              <a:t>O </a:t>
-            </a:r>
-            <a:r>
-              <a:rPr lang="pt-BR" sz="1200" b="1" i="0" kern="1200" dirty="0" smtClean="0">
-                <a:solidFill>
-                  <a:schemeClr val="tx1"/>
-                </a:solidFill>
-                <a:effectLst/>
-                <a:latin typeface="+mn-lt"/>
-                <a:ea typeface="+mn-ea"/>
-                <a:cs typeface="+mn-cs"/>
-              </a:rPr>
-              <a:t>display de 7 segmentos</a:t>
-            </a:r>
-            <a:r>
-              <a:rPr lang="pt-BR" sz="1200" b="0" i="0" kern="1200" dirty="0" smtClean="0">
-                <a:solidFill>
-                  <a:schemeClr val="tx1"/>
-                </a:solidFill>
-                <a:effectLst/>
-                <a:latin typeface="+mn-lt"/>
-                <a:ea typeface="+mn-ea"/>
-                <a:cs typeface="+mn-cs"/>
-              </a:rPr>
-              <a:t>, como o próprio nome diz, tem 7 partes, ou segmentos, que podem ser agrupados de modo a formar números e letras. Os segmentos são organizados de A </a:t>
-            </a:r>
-            <a:r>
-              <a:rPr lang="pt-BR" sz="1200" b="0" i="0" kern="1200" dirty="0" err="1" smtClean="0">
-                <a:solidFill>
-                  <a:schemeClr val="tx1"/>
-                </a:solidFill>
-                <a:effectLst/>
-                <a:latin typeface="+mn-lt"/>
-                <a:ea typeface="+mn-ea"/>
-                <a:cs typeface="+mn-cs"/>
-              </a:rPr>
-              <a:t>a</a:t>
-            </a:r>
-            <a:r>
-              <a:rPr lang="pt-BR" sz="1200" b="0" i="0" kern="1200" dirty="0" smtClean="0">
-                <a:solidFill>
-                  <a:schemeClr val="tx1"/>
-                </a:solidFill>
-                <a:effectLst/>
-                <a:latin typeface="+mn-lt"/>
-                <a:ea typeface="+mn-ea"/>
-                <a:cs typeface="+mn-cs"/>
-              </a:rPr>
-              <a:t> F.</a:t>
-            </a:r>
-            <a:r>
-              <a:rPr lang="pt-BR" sz="1200" b="0" i="0" kern="1200" baseline="0" dirty="0" smtClean="0">
-                <a:solidFill>
-                  <a:schemeClr val="tx1"/>
-                </a:solidFill>
-                <a:effectLst/>
-                <a:latin typeface="+mn-lt"/>
-                <a:ea typeface="+mn-ea"/>
-                <a:cs typeface="+mn-cs"/>
-              </a:rPr>
-              <a:t> </a:t>
-            </a:r>
-            <a:r>
-              <a:rPr lang="pt-BR" sz="1200" b="0" i="0" kern="1200" dirty="0" smtClean="0">
-                <a:solidFill>
-                  <a:schemeClr val="tx1"/>
-                </a:solidFill>
-                <a:effectLst/>
-                <a:latin typeface="+mn-lt"/>
-                <a:ea typeface="+mn-ea"/>
-                <a:cs typeface="+mn-cs"/>
-              </a:rPr>
-              <a:t>Assim, se você quiser mostrar o número 1, basta ativar os segmentos B e C. Para mostrar o número 3, os segmentos A, B, C, D e G, e assim por diante.</a:t>
-            </a:r>
-            <a:r>
-              <a:rPr lang="pt-BR" dirty="0" smtClean="0"/>
-              <a:t/>
-            </a:r>
-            <a:br>
-              <a:rPr lang="pt-BR" dirty="0" smtClean="0"/>
-            </a:br>
-            <a:endParaRPr lang="pt-BR" dirty="0"/>
-          </a:p>
-        </p:txBody>
-      </p:sp>
-      <p:sp>
-        <p:nvSpPr>
-          <p:cNvPr id="4" name="Espaço Reservado para Número de Slide 3"/>
-          <p:cNvSpPr>
-            <a:spLocks noGrp="1"/>
-          </p:cNvSpPr>
-          <p:nvPr>
-            <p:ph type="sldNum" sz="quarter" idx="10"/>
-          </p:nvPr>
-        </p:nvSpPr>
-        <p:spPr/>
-        <p:txBody>
-          <a:bodyPr/>
-          <a:lstStyle/>
-          <a:p>
-            <a:fld id="{FC3D6F94-60CB-40AD-B487-8AAA2521EEA5}" type="slidenum">
-              <a:rPr lang="pt-BR" smtClean="0"/>
-              <a:t>30</a:t>
-            </a:fld>
-            <a:endParaRPr lang="pt-BR"/>
-          </a:p>
-        </p:txBody>
-      </p:sp>
-    </p:spTree>
-    <p:extLst>
-      <p:ext uri="{BB962C8B-B14F-4D97-AF65-F5344CB8AC3E}">
-        <p14:creationId xmlns:p14="http://schemas.microsoft.com/office/powerpoint/2010/main" val="4159830138"/>
       </p:ext>
     </p:extLst>
   </p:cSld>
@@ -7738,257 +7426,6 @@
 </file>
 
 <file path=ppt/slides/slide13.xml><?xml version="1.0" encoding="utf-8"?>
-<p:sld xmlns:a="http://schemas.openxmlformats.org/drawingml/2006/main" xmlns:r="http://schemas.openxmlformats.org/officeDocument/2006/relationships" xmlns:p="http://schemas.openxmlformats.org/presentationml/2006/main" show="0">
-  <p:cSld>
-    <p:spTree>
-      <p:nvGrpSpPr>
-        <p:cNvPr id="1" name=""/>
-        <p:cNvGrpSpPr/>
-        <p:nvPr/>
-      </p:nvGrpSpPr>
-      <p:grpSpPr>
-        <a:xfrm>
-          <a:off x="0" y="0"/>
-          <a:ext cx="0" cy="0"/>
-          <a:chOff x="0" y="0"/>
-          <a:chExt cx="0" cy="0"/>
-        </a:xfrm>
-      </p:grpSpPr>
-      <p:pic>
-        <p:nvPicPr>
-          <p:cNvPr id="1026" name="Picture 2"/>
-          <p:cNvPicPr>
-            <a:picLocks noChangeAspect="1" noChangeArrowheads="1"/>
-          </p:cNvPicPr>
-          <p:nvPr/>
-        </p:nvPicPr>
-        <p:blipFill>
-          <a:blip r:embed="rId3">
-            <a:extLst>
-              <a:ext uri="{28A0092B-C50C-407E-A947-70E740481C1C}">
-                <a14:useLocalDpi xmlns:a14="http://schemas.microsoft.com/office/drawing/2010/main" val="0"/>
-              </a:ext>
-            </a:extLst>
-          </a:blip>
-          <a:srcRect/>
-          <a:stretch>
-            <a:fillRect/>
-          </a:stretch>
-        </p:blipFill>
-        <p:spPr bwMode="auto">
-          <a:xfrm>
-            <a:off x="3721049" y="1609424"/>
-            <a:ext cx="4887431" cy="3656164"/>
-          </a:xfrm>
-          <a:prstGeom prst="rect">
-            <a:avLst/>
-          </a:prstGeom>
-          <a:noFill/>
-          <a:ln>
-            <a:noFill/>
-          </a:ln>
-          <a:extLst>
-            <a:ext uri="{909E8E84-426E-40DD-AFC4-6F175D3DCCD1}">
-              <a14:hiddenFill xmlns:a14="http://schemas.microsoft.com/office/drawing/2010/main">
-                <a:solidFill>
-                  <a:schemeClr val="accent1"/>
-                </a:solidFill>
-              </a14:hiddenFill>
-            </a:ext>
-            <a:ext uri="{91240B29-F687-4F45-9708-019B960494DF}">
-              <a14:hiddenLine xmlns:a14="http://schemas.microsoft.com/office/drawing/2010/main" w="9525">
-                <a:solidFill>
-                  <a:schemeClr val="tx1"/>
-                </a:solidFill>
-                <a:miter lim="800000"/>
-                <a:headEnd/>
-                <a:tailEnd/>
-              </a14:hiddenLine>
-            </a:ext>
-          </a:extLst>
-        </p:spPr>
-      </p:pic>
-      <p:sp>
-        <p:nvSpPr>
-          <p:cNvPr id="2" name="Título 1"/>
-          <p:cNvSpPr>
-            <a:spLocks noGrp="1"/>
-          </p:cNvSpPr>
-          <p:nvPr>
-            <p:ph type="title"/>
-          </p:nvPr>
-        </p:nvSpPr>
-        <p:spPr/>
-        <p:txBody>
-          <a:bodyPr/>
-          <a:lstStyle/>
-          <a:p>
-            <a:r>
-              <a:rPr lang="pt-BR" dirty="0"/>
-              <a:t>Prática 2: instalando </a:t>
-            </a:r>
-            <a:r>
-              <a:rPr lang="pt-BR" dirty="0" err="1" smtClean="0"/>
-              <a:t>ArduBlock</a:t>
-            </a:r>
-            <a:endParaRPr lang="pt-BR" dirty="0"/>
-          </a:p>
-        </p:txBody>
-      </p:sp>
-      <p:sp>
-        <p:nvSpPr>
-          <p:cNvPr id="4" name="CaixaDeTexto 3"/>
-          <p:cNvSpPr txBox="1"/>
-          <p:nvPr/>
-        </p:nvSpPr>
-        <p:spPr>
-          <a:xfrm>
-            <a:off x="323528" y="1273324"/>
-            <a:ext cx="3240360" cy="3139321"/>
-          </a:xfrm>
-          <a:prstGeom prst="rect">
-            <a:avLst/>
-          </a:prstGeom>
-          <a:noFill/>
-          <a:ln>
-            <a:solidFill>
-              <a:schemeClr val="bg1"/>
-            </a:solidFill>
-          </a:ln>
-        </p:spPr>
-        <p:txBody>
-          <a:bodyPr wrap="square" rtlCol="0">
-            <a:spAutoFit/>
-          </a:bodyPr>
-          <a:lstStyle/>
-          <a:p>
-            <a:pPr marL="342900" indent="-342900">
-              <a:buFont typeface="+mj-lt"/>
-              <a:buAutoNum type="arabicPeriod"/>
-            </a:pPr>
-            <a:r>
-              <a:rPr lang="pt-BR" dirty="0" smtClean="0"/>
-              <a:t>Baixe em </a:t>
-            </a:r>
-            <a:r>
-              <a:rPr lang="pt-BR" dirty="0"/>
-              <a:t>techduino.ufsc.br </a:t>
-            </a:r>
-            <a:r>
-              <a:rPr lang="pt-BR" dirty="0">
-                <a:hlinkClick r:id="rId4"/>
-              </a:rPr>
-              <a:t>http://</a:t>
-            </a:r>
-            <a:r>
-              <a:rPr lang="pt-BR" dirty="0" smtClean="0">
-                <a:hlinkClick r:id="rId4"/>
-              </a:rPr>
-              <a:t>girardi.blumenau.ufsc.br/ardublock-all.jar</a:t>
-            </a:r>
-            <a:r>
-              <a:rPr lang="pt-BR" dirty="0" smtClean="0"/>
-              <a:t> </a:t>
-            </a:r>
-          </a:p>
-          <a:p>
-            <a:pPr marL="342900" indent="-342900">
-              <a:buFont typeface="+mj-lt"/>
-              <a:buAutoNum type="arabicPeriod"/>
-            </a:pPr>
-            <a:r>
-              <a:rPr lang="pt-BR" dirty="0" smtClean="0"/>
-              <a:t>Crie o caminho </a:t>
-            </a:r>
-            <a:r>
-              <a:rPr lang="pt-BR" dirty="0"/>
-              <a:t>C:/</a:t>
-            </a:r>
-            <a:r>
-              <a:rPr lang="pt-BR" dirty="0" smtClean="0"/>
-              <a:t>users/</a:t>
-            </a:r>
-            <a:r>
-              <a:rPr lang="pt-BR" i="1" dirty="0" smtClean="0"/>
-              <a:t>seu_usuario</a:t>
-            </a:r>
-            <a:r>
-              <a:rPr lang="pt-BR" dirty="0" smtClean="0"/>
-              <a:t>/Documents/Arduino/tools/ArduBlockTool/tool</a:t>
-            </a:r>
-          </a:p>
-          <a:p>
-            <a:pPr marL="342900" indent="-342900">
-              <a:buFont typeface="+mj-lt"/>
-              <a:buAutoNum type="arabicPeriod"/>
-            </a:pPr>
-            <a:r>
-              <a:rPr lang="pt-BR" dirty="0" smtClean="0"/>
-              <a:t>Copie o arquivo baixado</a:t>
-            </a:r>
-          </a:p>
-          <a:p>
-            <a:pPr marL="342900" indent="-342900">
-              <a:buFont typeface="+mj-lt"/>
-              <a:buAutoNum type="arabicPeriod"/>
-            </a:pPr>
-            <a:r>
-              <a:rPr lang="pt-BR" dirty="0" smtClean="0"/>
-              <a:t>Abra o </a:t>
-            </a:r>
-            <a:r>
-              <a:rPr lang="pt-BR" dirty="0" err="1" smtClean="0"/>
-              <a:t>ArduBlock</a:t>
-            </a:r>
-            <a:r>
-              <a:rPr lang="pt-BR" dirty="0" smtClean="0"/>
-              <a:t>, </a:t>
-            </a:r>
-            <a:r>
-              <a:rPr lang="pt-BR" dirty="0" err="1" smtClean="0"/>
-              <a:t>cliando</a:t>
-            </a:r>
-            <a:r>
-              <a:rPr lang="pt-BR" dirty="0" smtClean="0"/>
-              <a:t> na opção Ferramentas &gt; </a:t>
-            </a:r>
-            <a:r>
-              <a:rPr lang="pt-BR" dirty="0" err="1" smtClean="0"/>
-              <a:t>ArduBlock</a:t>
-            </a:r>
-            <a:endParaRPr lang="pt-BR" dirty="0" smtClean="0"/>
-          </a:p>
-        </p:txBody>
-      </p:sp>
-    </p:spTree>
-    <p:extLst>
-      <p:ext uri="{BB962C8B-B14F-4D97-AF65-F5344CB8AC3E}">
-        <p14:creationId xmlns:p14="http://schemas.microsoft.com/office/powerpoint/2010/main" val="1011170405"/>
-      </p:ext>
-    </p:extLst>
-  </p:cSld>
-  <p:clrMapOvr>
-    <a:masterClrMapping/>
-  </p:clrMapOvr>
-  <mc:AlternateContent xmlns:mc="http://schemas.openxmlformats.org/markup-compatibility/2006" xmlns:p14="http://schemas.microsoft.com/office/powerpoint/2010/main">
-    <mc:Choice Requires="p14">
-      <p:transition spd="slow" p14:dur="2000"/>
-    </mc:Choice>
-    <mc:Fallback xmlns="">
-      <p:transition spd="slow"/>
-    </mc:Fallback>
-  </mc:AlternateContent>
-  <p:timing>
-    <p:tnLst>
-      <p:par>
-        <p:cTn id="1" dur="indefinite" restart="never" nodeType="tmRoot"/>
-      </p:par>
-    </p:tnLst>
-  </p:timing>
-</p:sld>
-</file>
-
-<file path=ppt/slides/slide14.xml><?xml version="1.0" encoding="utf-8"?>
 <p:sld xmlns:a="http://schemas.openxmlformats.org/drawingml/2006/main" xmlns:r="http://schemas.openxmlformats.org/officeDocument/2006/relationships" xmlns:p="http://schemas.openxmlformats.org/presentationml/2006/main">
   <p:cSld>
     <p:spTree>
@@ -8203,131 +7640,7 @@
 </p:sld>
 </file>
 
-<file path=ppt/slides/slide15.xml><?xml version="1.0" encoding="utf-8"?>
-<p:sld xmlns:a="http://schemas.openxmlformats.org/drawingml/2006/main" xmlns:r="http://schemas.openxmlformats.org/officeDocument/2006/relationships" xmlns:p="http://schemas.openxmlformats.org/presentationml/2006/main" show="0">
-  <p:cSld>
-    <p:spTree>
-      <p:nvGrpSpPr>
-        <p:cNvPr id="1" name=""/>
-        <p:cNvGrpSpPr/>
-        <p:nvPr/>
-      </p:nvGrpSpPr>
-      <p:grpSpPr>
-        <a:xfrm>
-          <a:off x="0" y="0"/>
-          <a:ext cx="0" cy="0"/>
-          <a:chOff x="0" y="0"/>
-          <a:chExt cx="0" cy="0"/>
-        </a:xfrm>
-      </p:grpSpPr>
-      <p:sp>
-        <p:nvSpPr>
-          <p:cNvPr id="2" name="Título 1"/>
-          <p:cNvSpPr>
-            <a:spLocks noGrp="1"/>
-          </p:cNvSpPr>
-          <p:nvPr>
-            <p:ph type="title"/>
-          </p:nvPr>
-        </p:nvSpPr>
-        <p:spPr/>
-        <p:txBody>
-          <a:bodyPr>
-            <a:normAutofit fontScale="90000"/>
-          </a:bodyPr>
-          <a:lstStyle/>
-          <a:p>
-            <a:r>
-              <a:rPr lang="pt-BR" dirty="0" smtClean="0"/>
-              <a:t>Prática 3: semáforo verde e vermelho</a:t>
-            </a:r>
-            <a:endParaRPr lang="pt-BR" dirty="0"/>
-          </a:p>
-        </p:txBody>
-      </p:sp>
-      <p:pic>
-        <p:nvPicPr>
-          <p:cNvPr id="2050" name="Picture 2"/>
-          <p:cNvPicPr>
-            <a:picLocks noChangeAspect="1" noChangeArrowheads="1"/>
-          </p:cNvPicPr>
-          <p:nvPr/>
-        </p:nvPicPr>
-        <p:blipFill>
-          <a:blip r:embed="rId3">
-            <a:extLst>
-              <a:ext uri="{28A0092B-C50C-407E-A947-70E740481C1C}">
-                <a14:useLocalDpi xmlns:a14="http://schemas.microsoft.com/office/drawing/2010/main" val="0"/>
-              </a:ext>
-            </a:extLst>
-          </a:blip>
-          <a:srcRect/>
-          <a:stretch>
-            <a:fillRect/>
-          </a:stretch>
-        </p:blipFill>
-        <p:spPr bwMode="auto">
-          <a:xfrm>
-            <a:off x="2171899" y="1118785"/>
-            <a:ext cx="5262538" cy="3981287"/>
-          </a:xfrm>
-          <a:prstGeom prst="rect">
-            <a:avLst/>
-          </a:prstGeom>
-          <a:noFill/>
-          <a:ln>
-            <a:noFill/>
-          </a:ln>
-          <a:extLst>
-            <a:ext uri="{909E8E84-426E-40DD-AFC4-6F175D3DCCD1}">
-              <a14:hiddenFill xmlns:a14="http://schemas.microsoft.com/office/drawing/2010/main">
-                <a:solidFill>
-                  <a:schemeClr val="accent1"/>
-                </a:solidFill>
-              </a14:hiddenFill>
-            </a:ext>
-            <a:ext uri="{91240B29-F687-4F45-9708-019B960494DF}">
-              <a14:hiddenLine xmlns:a14="http://schemas.microsoft.com/office/drawing/2010/main" w="9525">
-                <a:solidFill>
-                  <a:schemeClr val="tx1"/>
-                </a:solidFill>
-                <a:miter lim="800000"/>
-                <a:headEnd/>
-                <a:tailEnd/>
-              </a14:hiddenLine>
-            </a:ext>
-          </a:extLst>
-        </p:spPr>
-      </p:pic>
-    </p:spTree>
-    <p:extLst>
-      <p:ext uri="{BB962C8B-B14F-4D97-AF65-F5344CB8AC3E}">
-        <p14:creationId xmlns:p14="http://schemas.microsoft.com/office/powerpoint/2010/main" val="2326361262"/>
-      </p:ext>
-    </p:extLst>
-  </p:cSld>
-  <p:clrMapOvr>
-    <a:masterClrMapping/>
-  </p:clrMapOvr>
-  <mc:AlternateContent xmlns:mc="http://schemas.openxmlformats.org/markup-compatibility/2006" xmlns:p14="http://schemas.microsoft.com/office/powerpoint/2010/main">
-    <mc:Choice Requires="p14">
-      <p:transition spd="slow" p14:dur="2000"/>
-    </mc:Choice>
-    <mc:Fallback xmlns="">
-      <p:transition spd="slow"/>
-    </mc:Fallback>
-  </mc:AlternateContent>
-  <p:timing>
-    <p:tnLst>
-      <p:par>
-        <p:cTn id="1" dur="indefinite" restart="never" nodeType="tmRoot"/>
-      </p:par>
-    </p:tnLst>
-  </p:timing>
-</p:sld>
-</file>
-
-<file path=ppt/slides/slide16.xml><?xml version="1.0" encoding="utf-8"?>
+<file path=ppt/slides/slide14.xml><?xml version="1.0" encoding="utf-8"?>
 <p:sld xmlns:a="http://schemas.openxmlformats.org/drawingml/2006/main" xmlns:r="http://schemas.openxmlformats.org/officeDocument/2006/relationships" xmlns:p="http://schemas.openxmlformats.org/presentationml/2006/main">
   <p:cSld>
     <p:spTree>
@@ -8440,7 +7753,7 @@
 </p:sld>
 </file>
 
-<file path=ppt/slides/slide17.xml><?xml version="1.0" encoding="utf-8"?>
+<file path=ppt/slides/slide15.xml><?xml version="1.0" encoding="utf-8"?>
 <p:sld xmlns:a="http://schemas.openxmlformats.org/drawingml/2006/main" xmlns:r="http://schemas.openxmlformats.org/officeDocument/2006/relationships" xmlns:p="http://schemas.openxmlformats.org/presentationml/2006/main">
   <p:cSld>
     <p:spTree>
@@ -8556,7 +7869,7 @@
 </p:sld>
 </file>
 
-<file path=ppt/slides/slide18.xml><?xml version="1.0" encoding="utf-8"?>
+<file path=ppt/slides/slide16.xml><?xml version="1.0" encoding="utf-8"?>
 <p:sld xmlns:a="http://schemas.openxmlformats.org/drawingml/2006/main" xmlns:r="http://schemas.openxmlformats.org/officeDocument/2006/relationships" xmlns:p="http://schemas.openxmlformats.org/presentationml/2006/main">
   <p:cSld>
     <p:spTree>
@@ -8667,7 +7980,7 @@
 </p:sld>
 </file>
 
-<file path=ppt/slides/slide19.xml><?xml version="1.0" encoding="utf-8"?>
+<file path=ppt/slides/slide17.xml><?xml version="1.0" encoding="utf-8"?>
 <p:sld xmlns:a="http://schemas.openxmlformats.org/drawingml/2006/main" xmlns:r="http://schemas.openxmlformats.org/officeDocument/2006/relationships" xmlns:p="http://schemas.openxmlformats.org/presentationml/2006/main">
   <p:cSld>
     <p:spTree>
@@ -8778,67 +8091,7 @@
 </p:sld>
 </file>
 
-<file path=ppt/slides/slide2.xml><?xml version="1.0" encoding="utf-8"?>
-<p:sld xmlns:a="http://schemas.openxmlformats.org/drawingml/2006/main" xmlns:r="http://schemas.openxmlformats.org/officeDocument/2006/relationships" xmlns:p="http://schemas.openxmlformats.org/presentationml/2006/main">
-  <p:cSld>
-    <p:spTree>
-      <p:nvGrpSpPr>
-        <p:cNvPr id="1" name=""/>
-        <p:cNvGrpSpPr/>
-        <p:nvPr/>
-      </p:nvGrpSpPr>
-      <p:grpSpPr>
-        <a:xfrm>
-          <a:off x="0" y="0"/>
-          <a:ext cx="0" cy="0"/>
-          <a:chOff x="0" y="0"/>
-          <a:chExt cx="0" cy="0"/>
-        </a:xfrm>
-      </p:grpSpPr>
-      <p:sp>
-        <p:nvSpPr>
-          <p:cNvPr id="2" name="Título 1"/>
-          <p:cNvSpPr>
-            <a:spLocks noGrp="1"/>
-          </p:cNvSpPr>
-          <p:nvPr>
-            <p:ph type="title"/>
-          </p:nvPr>
-        </p:nvSpPr>
-        <p:spPr/>
-        <p:txBody>
-          <a:bodyPr/>
-          <a:lstStyle/>
-          <a:p>
-            <a:r>
-              <a:rPr lang="pt-BR" dirty="0" smtClean="0"/>
-              <a:t>Projetos prontos</a:t>
-            </a:r>
-            <a:endParaRPr lang="pt-BR" dirty="0"/>
-          </a:p>
-        </p:txBody>
-      </p:sp>
-    </p:spTree>
-    <p:extLst>
-      <p:ext uri="{BB962C8B-B14F-4D97-AF65-F5344CB8AC3E}">
-        <p14:creationId xmlns:p14="http://schemas.microsoft.com/office/powerpoint/2010/main" val="4008944772"/>
-      </p:ext>
-    </p:extLst>
-  </p:cSld>
-  <p:clrMapOvr>
-    <a:masterClrMapping/>
-  </p:clrMapOvr>
-  <p:timing>
-    <p:tnLst>
-      <p:par>
-        <p:cTn id="1" dur="indefinite" restart="never" nodeType="tmRoot"/>
-      </p:par>
-    </p:tnLst>
-  </p:timing>
-</p:sld>
-</file>
-
-<file path=ppt/slides/slide20.xml><?xml version="1.0" encoding="utf-8"?>
+<file path=ppt/slides/slide18.xml><?xml version="1.0" encoding="utf-8"?>
 <p:sld xmlns:a="http://schemas.openxmlformats.org/drawingml/2006/main" xmlns:r="http://schemas.openxmlformats.org/officeDocument/2006/relationships" xmlns:p="http://schemas.openxmlformats.org/presentationml/2006/main">
   <p:cSld>
     <p:spTree>
@@ -8990,7 +8243,7 @@
 </p:sld>
 </file>
 
-<file path=ppt/slides/slide21.xml><?xml version="1.0" encoding="utf-8"?>
+<file path=ppt/slides/slide19.xml><?xml version="1.0" encoding="utf-8"?>
 <p:sld xmlns:a="http://schemas.openxmlformats.org/drawingml/2006/main" xmlns:r="http://schemas.openxmlformats.org/officeDocument/2006/relationships" xmlns:p="http://schemas.openxmlformats.org/presentationml/2006/main">
   <p:cSld>
     <p:spTree>
@@ -9309,7 +8562,67 @@
 </p:sld>
 </file>
 
-<file path=ppt/slides/slide22.xml><?xml version="1.0" encoding="utf-8"?>
+<file path=ppt/slides/slide2.xml><?xml version="1.0" encoding="utf-8"?>
+<p:sld xmlns:a="http://schemas.openxmlformats.org/drawingml/2006/main" xmlns:r="http://schemas.openxmlformats.org/officeDocument/2006/relationships" xmlns:p="http://schemas.openxmlformats.org/presentationml/2006/main">
+  <p:cSld>
+    <p:spTree>
+      <p:nvGrpSpPr>
+        <p:cNvPr id="1" name=""/>
+        <p:cNvGrpSpPr/>
+        <p:nvPr/>
+      </p:nvGrpSpPr>
+      <p:grpSpPr>
+        <a:xfrm>
+          <a:off x="0" y="0"/>
+          <a:ext cx="0" cy="0"/>
+          <a:chOff x="0" y="0"/>
+          <a:chExt cx="0" cy="0"/>
+        </a:xfrm>
+      </p:grpSpPr>
+      <p:sp>
+        <p:nvSpPr>
+          <p:cNvPr id="2" name="Título 1"/>
+          <p:cNvSpPr>
+            <a:spLocks noGrp="1"/>
+          </p:cNvSpPr>
+          <p:nvPr>
+            <p:ph type="title"/>
+          </p:nvPr>
+        </p:nvSpPr>
+        <p:spPr/>
+        <p:txBody>
+          <a:bodyPr/>
+          <a:lstStyle/>
+          <a:p>
+            <a:r>
+              <a:rPr lang="pt-BR" dirty="0" smtClean="0"/>
+              <a:t>Projetos prontos</a:t>
+            </a:r>
+            <a:endParaRPr lang="pt-BR" dirty="0"/>
+          </a:p>
+        </p:txBody>
+      </p:sp>
+    </p:spTree>
+    <p:extLst>
+      <p:ext uri="{BB962C8B-B14F-4D97-AF65-F5344CB8AC3E}">
+        <p14:creationId xmlns:p14="http://schemas.microsoft.com/office/powerpoint/2010/main" val="4008944772"/>
+      </p:ext>
+    </p:extLst>
+  </p:cSld>
+  <p:clrMapOvr>
+    <a:masterClrMapping/>
+  </p:clrMapOvr>
+  <p:timing>
+    <p:tnLst>
+      <p:par>
+        <p:cTn id="1" dur="indefinite" restart="never" nodeType="tmRoot"/>
+      </p:par>
+    </p:tnLst>
+  </p:timing>
+</p:sld>
+</file>
+
+<file path=ppt/slides/slide20.xml><?xml version="1.0" encoding="utf-8"?>
 <p:sld xmlns:a="http://schemas.openxmlformats.org/drawingml/2006/main" xmlns:r="http://schemas.openxmlformats.org/officeDocument/2006/relationships" xmlns:p="http://schemas.openxmlformats.org/presentationml/2006/main">
   <p:cSld>
     <p:spTree>
@@ -9401,7 +8714,7 @@
 </p:sld>
 </file>
 
-<file path=ppt/slides/slide23.xml><?xml version="1.0" encoding="utf-8"?>
+<file path=ppt/slides/slide21.xml><?xml version="1.0" encoding="utf-8"?>
 <p:sld xmlns:a="http://schemas.openxmlformats.org/drawingml/2006/main" xmlns:r="http://schemas.openxmlformats.org/officeDocument/2006/relationships" xmlns:p="http://schemas.openxmlformats.org/presentationml/2006/main">
   <p:cSld>
     <p:spTree>
@@ -9600,7 +8913,7 @@
 </p:sld>
 </file>
 
-<file path=ppt/slides/slide24.xml><?xml version="1.0" encoding="utf-8"?>
+<file path=ppt/slides/slide22.xml><?xml version="1.0" encoding="utf-8"?>
 <p:sld xmlns:a="http://schemas.openxmlformats.org/drawingml/2006/main" xmlns:r="http://schemas.openxmlformats.org/officeDocument/2006/relationships" xmlns:p="http://schemas.openxmlformats.org/presentationml/2006/main">
   <p:cSld>
     <p:spTree>
@@ -9853,7 +9166,7 @@
 </p:sld>
 </file>
 
-<file path=ppt/slides/slide25.xml><?xml version="1.0" encoding="utf-8"?>
+<file path=ppt/slides/slide23.xml><?xml version="1.0" encoding="utf-8"?>
 <p:sld xmlns:a="http://schemas.openxmlformats.org/drawingml/2006/main" xmlns:r="http://schemas.openxmlformats.org/officeDocument/2006/relationships" xmlns:p="http://schemas.openxmlformats.org/presentationml/2006/main">
   <p:cSld>
     <p:spTree>
@@ -9969,7 +9282,7 @@
 </p:sld>
 </file>
 
-<file path=ppt/slides/slide26.xml><?xml version="1.0" encoding="utf-8"?>
+<file path=ppt/slides/slide24.xml><?xml version="1.0" encoding="utf-8"?>
 <p:sld xmlns:a="http://schemas.openxmlformats.org/drawingml/2006/main" xmlns:r="http://schemas.openxmlformats.org/officeDocument/2006/relationships" xmlns:p="http://schemas.openxmlformats.org/presentationml/2006/main">
   <p:cSld>
     <p:spTree>
@@ -10061,7 +9374,7 @@
 </p:sld>
 </file>
 
-<file path=ppt/slides/slide27.xml><?xml version="1.0" encoding="utf-8"?>
+<file path=ppt/slides/slide25.xml><?xml version="1.0" encoding="utf-8"?>
 <p:sld xmlns:a="http://schemas.openxmlformats.org/drawingml/2006/main" xmlns:r="http://schemas.openxmlformats.org/officeDocument/2006/relationships" xmlns:p="http://schemas.openxmlformats.org/presentationml/2006/main">
   <p:cSld>
     <p:spTree>
@@ -10153,7 +9466,7 @@
 </p:sld>
 </file>
 
-<file path=ppt/slides/slide28.xml><?xml version="1.0" encoding="utf-8"?>
+<file path=ppt/slides/slide26.xml><?xml version="1.0" encoding="utf-8"?>
 <p:sld xmlns:a="http://schemas.openxmlformats.org/drawingml/2006/main" xmlns:r="http://schemas.openxmlformats.org/officeDocument/2006/relationships" xmlns:p="http://schemas.openxmlformats.org/presentationml/2006/main">
   <p:cSld>
     <p:spTree>
@@ -10323,7 +9636,7 @@
 </p:sld>
 </file>
 
-<file path=ppt/slides/slide29.xml><?xml version="1.0" encoding="utf-8"?>
+<file path=ppt/slides/slide27.xml><?xml version="1.0" encoding="utf-8"?>
 <p:sld xmlns:a="http://schemas.openxmlformats.org/drawingml/2006/main" xmlns:r="http://schemas.openxmlformats.org/officeDocument/2006/relationships" xmlns:p="http://schemas.openxmlformats.org/presentationml/2006/main">
   <p:cSld>
     <p:spTree>
@@ -10477,6 +9790,303 @@
     <p:extLst>
       <p:ext uri="{BB962C8B-B14F-4D97-AF65-F5344CB8AC3E}">
         <p14:creationId xmlns:p14="http://schemas.microsoft.com/office/powerpoint/2010/main" val="3486297373"/>
+      </p:ext>
+    </p:extLst>
+  </p:cSld>
+  <p:clrMapOvr>
+    <a:masterClrMapping/>
+  </p:clrMapOvr>
+  <p:timing>
+    <p:tnLst>
+      <p:par>
+        <p:cTn id="1" dur="indefinite" restart="never" nodeType="tmRoot"/>
+      </p:par>
+    </p:tnLst>
+  </p:timing>
+</p:sld>
+</file>
+
+<file path=ppt/slides/slide28.xml><?xml version="1.0" encoding="utf-8"?>
+<p:sld xmlns:a="http://schemas.openxmlformats.org/drawingml/2006/main" xmlns:r="http://schemas.openxmlformats.org/officeDocument/2006/relationships" xmlns:p="http://schemas.openxmlformats.org/presentationml/2006/main">
+  <p:cSld>
+    <p:spTree>
+      <p:nvGrpSpPr>
+        <p:cNvPr id="1" name=""/>
+        <p:cNvGrpSpPr/>
+        <p:nvPr/>
+      </p:nvGrpSpPr>
+      <p:grpSpPr>
+        <a:xfrm>
+          <a:off x="0" y="0"/>
+          <a:ext cx="0" cy="0"/>
+          <a:chOff x="0" y="0"/>
+          <a:chExt cx="0" cy="0"/>
+        </a:xfrm>
+      </p:grpSpPr>
+      <p:sp>
+        <p:nvSpPr>
+          <p:cNvPr id="2" name="Título 1"/>
+          <p:cNvSpPr>
+            <a:spLocks noGrp="1"/>
+          </p:cNvSpPr>
+          <p:nvPr>
+            <p:ph type="title"/>
+          </p:nvPr>
+        </p:nvSpPr>
+        <p:spPr/>
+        <p:txBody>
+          <a:bodyPr>
+            <a:normAutofit/>
+          </a:bodyPr>
+          <a:lstStyle/>
+          <a:p>
+            <a:r>
+              <a:rPr lang="pt-BR" dirty="0" smtClean="0"/>
+              <a:t>Prática 7: display de 7 segmentos</a:t>
+            </a:r>
+            <a:endParaRPr lang="pt-BR" dirty="0"/>
+          </a:p>
+        </p:txBody>
+      </p:sp>
+      <p:sp>
+        <p:nvSpPr>
+          <p:cNvPr id="3" name="Retângulo 2"/>
+          <p:cNvSpPr/>
+          <p:nvPr/>
+        </p:nvSpPr>
+        <p:spPr>
+          <a:xfrm>
+            <a:off x="755576" y="1129308"/>
+            <a:ext cx="4572000" cy="2031325"/>
+          </a:xfrm>
+          <a:prstGeom prst="rect">
+            <a:avLst/>
+          </a:prstGeom>
+        </p:spPr>
+        <p:txBody>
+          <a:bodyPr>
+            <a:spAutoFit/>
+          </a:bodyPr>
+          <a:lstStyle/>
+          <a:p>
+            <a:r>
+              <a:rPr lang="pt-BR" dirty="0"/>
+              <a:t>Material necessário:</a:t>
+            </a:r>
+          </a:p>
+          <a:p>
+            <a:pPr marL="285750" indent="-285750">
+              <a:buFont typeface="Arial" panose="020B0604020202020204" pitchFamily="34" charset="0"/>
+              <a:buChar char="•"/>
+            </a:pPr>
+            <a:r>
+              <a:rPr lang="pt-BR" dirty="0"/>
+              <a:t>1 placa </a:t>
+            </a:r>
+            <a:r>
+              <a:rPr lang="pt-BR" dirty="0" err="1"/>
+              <a:t>Arduino</a:t>
+            </a:r>
+            <a:endParaRPr lang="pt-BR" dirty="0"/>
+          </a:p>
+          <a:p>
+            <a:pPr marL="285750" indent="-285750">
+              <a:buFont typeface="Arial" panose="020B0604020202020204" pitchFamily="34" charset="0"/>
+              <a:buChar char="•"/>
+            </a:pPr>
+            <a:r>
+              <a:rPr lang="pt-BR" dirty="0"/>
+              <a:t>1 placa </a:t>
+            </a:r>
+            <a:r>
+              <a:rPr lang="pt-BR" dirty="0" err="1"/>
+              <a:t>protoboard</a:t>
+            </a:r>
+            <a:endParaRPr lang="pt-BR" dirty="0"/>
+          </a:p>
+          <a:p>
+            <a:pPr marL="285750" indent="-285750">
+              <a:buFont typeface="Arial" panose="020B0604020202020204" pitchFamily="34" charset="0"/>
+              <a:buChar char="•"/>
+            </a:pPr>
+            <a:r>
+              <a:rPr lang="pt-BR" dirty="0"/>
+              <a:t>1 cabo USB</a:t>
+            </a:r>
+          </a:p>
+          <a:p>
+            <a:pPr marL="285750" indent="-285750">
+              <a:buFont typeface="Arial" panose="020B0604020202020204" pitchFamily="34" charset="0"/>
+              <a:buChar char="•"/>
+            </a:pPr>
+            <a:r>
+              <a:rPr lang="pt-BR" dirty="0" smtClean="0"/>
+              <a:t>1 resistor </a:t>
+            </a:r>
+            <a:r>
+              <a:rPr lang="pt-BR" dirty="0"/>
+              <a:t>300 </a:t>
+            </a:r>
+            <a:r>
+              <a:rPr lang="el-GR" dirty="0" smtClean="0"/>
+              <a:t>Ω</a:t>
+            </a:r>
+            <a:endParaRPr lang="pt-BR" dirty="0" smtClean="0"/>
+          </a:p>
+          <a:p>
+            <a:pPr marL="285750" indent="-285750">
+              <a:buFont typeface="Arial" panose="020B0604020202020204" pitchFamily="34" charset="0"/>
+              <a:buChar char="•"/>
+            </a:pPr>
+            <a:r>
+              <a:rPr lang="pt-BR" dirty="0" smtClean="0"/>
+              <a:t>1 display de 7 segmentos</a:t>
+            </a:r>
+            <a:endParaRPr lang="pt-BR" dirty="0"/>
+          </a:p>
+          <a:p>
+            <a:pPr marL="285750" indent="-285750">
+              <a:buFont typeface="Arial" panose="020B0604020202020204" pitchFamily="34" charset="0"/>
+              <a:buChar char="•"/>
+            </a:pPr>
+            <a:r>
+              <a:rPr lang="pt-BR" dirty="0" smtClean="0"/>
+              <a:t>Fios </a:t>
+            </a:r>
+            <a:r>
+              <a:rPr lang="pt-BR" dirty="0" smtClean="0"/>
+              <a:t>jumpers</a:t>
+            </a:r>
+            <a:endParaRPr lang="pt-BR" dirty="0"/>
+          </a:p>
+        </p:txBody>
+      </p:sp>
+      <p:pic>
+        <p:nvPicPr>
+          <p:cNvPr id="4" name="Imagem 3"/>
+          <p:cNvPicPr>
+            <a:picLocks noChangeAspect="1"/>
+          </p:cNvPicPr>
+          <p:nvPr/>
+        </p:nvPicPr>
+        <p:blipFill>
+          <a:blip r:embed="rId3" cstate="print">
+            <a:extLst>
+              <a:ext uri="{28A0092B-C50C-407E-A947-70E740481C1C}">
+                <a14:useLocalDpi xmlns:a14="http://schemas.microsoft.com/office/drawing/2010/main" val="0"/>
+              </a:ext>
+            </a:extLst>
+          </a:blip>
+          <a:stretch>
+            <a:fillRect/>
+          </a:stretch>
+        </p:blipFill>
+        <p:spPr>
+          <a:xfrm>
+            <a:off x="4644008" y="2353444"/>
+            <a:ext cx="2288611" cy="2569468"/>
+          </a:xfrm>
+          <a:prstGeom prst="rect">
+            <a:avLst/>
+          </a:prstGeom>
+        </p:spPr>
+      </p:pic>
+    </p:spTree>
+    <p:extLst>
+      <p:ext uri="{BB962C8B-B14F-4D97-AF65-F5344CB8AC3E}">
+        <p14:creationId xmlns:p14="http://schemas.microsoft.com/office/powerpoint/2010/main" val="2287880923"/>
+      </p:ext>
+    </p:extLst>
+  </p:cSld>
+  <p:clrMapOvr>
+    <a:masterClrMapping/>
+  </p:clrMapOvr>
+  <p:timing>
+    <p:tnLst>
+      <p:par>
+        <p:cTn id="1" dur="indefinite" restart="never" nodeType="tmRoot"/>
+      </p:par>
+    </p:tnLst>
+  </p:timing>
+</p:sld>
+</file>
+
+<file path=ppt/slides/slide29.xml><?xml version="1.0" encoding="utf-8"?>
+<p:sld xmlns:a="http://schemas.openxmlformats.org/drawingml/2006/main" xmlns:r="http://schemas.openxmlformats.org/officeDocument/2006/relationships" xmlns:p="http://schemas.openxmlformats.org/presentationml/2006/main">
+  <p:cSld>
+    <p:spTree>
+      <p:nvGrpSpPr>
+        <p:cNvPr id="1" name=""/>
+        <p:cNvGrpSpPr/>
+        <p:nvPr/>
+      </p:nvGrpSpPr>
+      <p:grpSpPr>
+        <a:xfrm>
+          <a:off x="0" y="0"/>
+          <a:ext cx="0" cy="0"/>
+          <a:chOff x="0" y="0"/>
+          <a:chExt cx="0" cy="0"/>
+        </a:xfrm>
+      </p:grpSpPr>
+      <p:sp>
+        <p:nvSpPr>
+          <p:cNvPr id="2" name="Título 1"/>
+          <p:cNvSpPr>
+            <a:spLocks noGrp="1"/>
+          </p:cNvSpPr>
+          <p:nvPr>
+            <p:ph type="title"/>
+          </p:nvPr>
+        </p:nvSpPr>
+        <p:spPr/>
+        <p:txBody>
+          <a:bodyPr>
+            <a:normAutofit/>
+          </a:bodyPr>
+          <a:lstStyle/>
+          <a:p>
+            <a:r>
+              <a:rPr lang="pt-BR" dirty="0" smtClean="0"/>
+              <a:t>Prática 7: display de 7 segmentos</a:t>
+            </a:r>
+            <a:endParaRPr lang="pt-BR" dirty="0"/>
+          </a:p>
+        </p:txBody>
+      </p:sp>
+      <p:pic>
+        <p:nvPicPr>
+          <p:cNvPr id="5" name="Imagem 4"/>
+          <p:cNvPicPr>
+            <a:picLocks noChangeAspect="1"/>
+          </p:cNvPicPr>
+          <p:nvPr/>
+        </p:nvPicPr>
+        <p:blipFill>
+          <a:blip r:embed="rId2">
+            <a:extLst>
+              <a:ext uri="{28A0092B-C50C-407E-A947-70E740481C1C}">
+                <a14:useLocalDpi xmlns:a14="http://schemas.microsoft.com/office/drawing/2010/main" val="0"/>
+              </a:ext>
+            </a:extLst>
+          </a:blip>
+          <a:stretch>
+            <a:fillRect/>
+          </a:stretch>
+        </p:blipFill>
+        <p:spPr>
+          <a:xfrm>
+            <a:off x="1629331" y="1345332"/>
+            <a:ext cx="5867400" cy="3876675"/>
+          </a:xfrm>
+          <a:prstGeom prst="rect">
+            <a:avLst/>
+          </a:prstGeom>
+        </p:spPr>
+      </p:pic>
+    </p:spTree>
+    <p:extLst>
+      <p:ext uri="{BB962C8B-B14F-4D97-AF65-F5344CB8AC3E}">
+        <p14:creationId xmlns:p14="http://schemas.microsoft.com/office/powerpoint/2010/main" val="2642927392"/>
       </p:ext>
     </p:extLst>
   </p:cSld>
@@ -11486,357 +11096,6 @@
           </a:p>
         </p:txBody>
       </p:sp>
-      <p:sp>
-        <p:nvSpPr>
-          <p:cNvPr id="3" name="Retângulo 2"/>
-          <p:cNvSpPr/>
-          <p:nvPr/>
-        </p:nvSpPr>
-        <p:spPr>
-          <a:xfrm>
-            <a:off x="755576" y="1129308"/>
-            <a:ext cx="4572000" cy="2031325"/>
-          </a:xfrm>
-          <a:prstGeom prst="rect">
-            <a:avLst/>
-          </a:prstGeom>
-        </p:spPr>
-        <p:txBody>
-          <a:bodyPr>
-            <a:spAutoFit/>
-          </a:bodyPr>
-          <a:lstStyle/>
-          <a:p>
-            <a:r>
-              <a:rPr lang="pt-BR" dirty="0"/>
-              <a:t>Material necessário:</a:t>
-            </a:r>
-          </a:p>
-          <a:p>
-            <a:pPr marL="285750" indent="-285750">
-              <a:buFont typeface="Arial" panose="020B0604020202020204" pitchFamily="34" charset="0"/>
-              <a:buChar char="•"/>
-            </a:pPr>
-            <a:r>
-              <a:rPr lang="pt-BR" dirty="0"/>
-              <a:t>1 placa </a:t>
-            </a:r>
-            <a:r>
-              <a:rPr lang="pt-BR" dirty="0" err="1"/>
-              <a:t>Arduino</a:t>
-            </a:r>
-            <a:endParaRPr lang="pt-BR" dirty="0"/>
-          </a:p>
-          <a:p>
-            <a:pPr marL="285750" indent="-285750">
-              <a:buFont typeface="Arial" panose="020B0604020202020204" pitchFamily="34" charset="0"/>
-              <a:buChar char="•"/>
-            </a:pPr>
-            <a:r>
-              <a:rPr lang="pt-BR" dirty="0"/>
-              <a:t>1 placa </a:t>
-            </a:r>
-            <a:r>
-              <a:rPr lang="pt-BR" dirty="0" err="1"/>
-              <a:t>protoboard</a:t>
-            </a:r>
-            <a:endParaRPr lang="pt-BR" dirty="0"/>
-          </a:p>
-          <a:p>
-            <a:pPr marL="285750" indent="-285750">
-              <a:buFont typeface="Arial" panose="020B0604020202020204" pitchFamily="34" charset="0"/>
-              <a:buChar char="•"/>
-            </a:pPr>
-            <a:r>
-              <a:rPr lang="pt-BR" dirty="0"/>
-              <a:t>1 cabo USB</a:t>
-            </a:r>
-          </a:p>
-          <a:p>
-            <a:pPr marL="285750" indent="-285750">
-              <a:buFont typeface="Arial" panose="020B0604020202020204" pitchFamily="34" charset="0"/>
-              <a:buChar char="•"/>
-            </a:pPr>
-            <a:r>
-              <a:rPr lang="pt-BR" dirty="0" smtClean="0"/>
-              <a:t>1 resistor </a:t>
-            </a:r>
-            <a:r>
-              <a:rPr lang="pt-BR" dirty="0"/>
-              <a:t>300 </a:t>
-            </a:r>
-            <a:r>
-              <a:rPr lang="el-GR" dirty="0" smtClean="0"/>
-              <a:t>Ω</a:t>
-            </a:r>
-            <a:endParaRPr lang="pt-BR" dirty="0" smtClean="0"/>
-          </a:p>
-          <a:p>
-            <a:pPr marL="285750" indent="-285750">
-              <a:buFont typeface="Arial" panose="020B0604020202020204" pitchFamily="34" charset="0"/>
-              <a:buChar char="•"/>
-            </a:pPr>
-            <a:r>
-              <a:rPr lang="pt-BR" dirty="0" smtClean="0"/>
-              <a:t>1 display de 7 segmentos</a:t>
-            </a:r>
-            <a:endParaRPr lang="pt-BR" dirty="0"/>
-          </a:p>
-          <a:p>
-            <a:pPr marL="285750" indent="-285750">
-              <a:buFont typeface="Arial" panose="020B0604020202020204" pitchFamily="34" charset="0"/>
-              <a:buChar char="•"/>
-            </a:pPr>
-            <a:r>
-              <a:rPr lang="pt-BR" dirty="0" smtClean="0"/>
-              <a:t>Fios </a:t>
-            </a:r>
-            <a:r>
-              <a:rPr lang="pt-BR" dirty="0" smtClean="0"/>
-              <a:t>jumpers</a:t>
-            </a:r>
-            <a:endParaRPr lang="pt-BR" dirty="0"/>
-          </a:p>
-        </p:txBody>
-      </p:sp>
-      <p:pic>
-        <p:nvPicPr>
-          <p:cNvPr id="4" name="Imagem 3"/>
-          <p:cNvPicPr>
-            <a:picLocks noChangeAspect="1"/>
-          </p:cNvPicPr>
-          <p:nvPr/>
-        </p:nvPicPr>
-        <p:blipFill>
-          <a:blip r:embed="rId3" cstate="print">
-            <a:extLst>
-              <a:ext uri="{28A0092B-C50C-407E-A947-70E740481C1C}">
-                <a14:useLocalDpi xmlns:a14="http://schemas.microsoft.com/office/drawing/2010/main" val="0"/>
-              </a:ext>
-            </a:extLst>
-          </a:blip>
-          <a:stretch>
-            <a:fillRect/>
-          </a:stretch>
-        </p:blipFill>
-        <p:spPr>
-          <a:xfrm>
-            <a:off x="4067944" y="2065412"/>
-            <a:ext cx="2288611" cy="2569468"/>
-          </a:xfrm>
-          <a:prstGeom prst="rect">
-            <a:avLst/>
-          </a:prstGeom>
-        </p:spPr>
-      </p:pic>
-      <p:pic>
-        <p:nvPicPr>
-          <p:cNvPr id="1026" name="Picture 2"/>
-          <p:cNvPicPr>
-            <a:picLocks noChangeAspect="1" noChangeArrowheads="1"/>
-          </p:cNvPicPr>
-          <p:nvPr/>
-        </p:nvPicPr>
-        <p:blipFill>
-          <a:blip r:embed="rId4">
-            <a:extLst>
-              <a:ext uri="{28A0092B-C50C-407E-A947-70E740481C1C}">
-                <a14:useLocalDpi xmlns:a14="http://schemas.microsoft.com/office/drawing/2010/main" val="0"/>
-              </a:ext>
-            </a:extLst>
-          </a:blip>
-          <a:srcRect/>
-          <a:stretch>
-            <a:fillRect/>
-          </a:stretch>
-        </p:blipFill>
-        <p:spPr bwMode="auto">
-          <a:xfrm>
-            <a:off x="6488502" y="1084183"/>
-            <a:ext cx="2115945" cy="4522314"/>
-          </a:xfrm>
-          <a:prstGeom prst="rect">
-            <a:avLst/>
-          </a:prstGeom>
-          <a:noFill/>
-          <a:ln>
-            <a:noFill/>
-          </a:ln>
-          <a:extLst>
-            <a:ext uri="{909E8E84-426E-40DD-AFC4-6F175D3DCCD1}">
-              <a14:hiddenFill xmlns:a14="http://schemas.microsoft.com/office/drawing/2010/main">
-                <a:solidFill>
-                  <a:schemeClr val="accent1"/>
-                </a:solidFill>
-              </a14:hiddenFill>
-            </a:ext>
-            <a:ext uri="{91240B29-F687-4F45-9708-019B960494DF}">
-              <a14:hiddenLine xmlns:a14="http://schemas.microsoft.com/office/drawing/2010/main" w="9525">
-                <a:solidFill>
-                  <a:schemeClr val="tx1"/>
-                </a:solidFill>
-                <a:miter lim="800000"/>
-                <a:headEnd/>
-                <a:tailEnd/>
-              </a14:hiddenLine>
-            </a:ext>
-          </a:extLst>
-        </p:spPr>
-      </p:pic>
-    </p:spTree>
-    <p:extLst>
-      <p:ext uri="{BB962C8B-B14F-4D97-AF65-F5344CB8AC3E}">
-        <p14:creationId xmlns:p14="http://schemas.microsoft.com/office/powerpoint/2010/main" val="2287880923"/>
-      </p:ext>
-    </p:extLst>
-  </p:cSld>
-  <p:clrMapOvr>
-    <a:masterClrMapping/>
-  </p:clrMapOvr>
-  <p:timing>
-    <p:tnLst>
-      <p:par>
-        <p:cTn id="1" dur="indefinite" restart="never" nodeType="tmRoot"/>
-      </p:par>
-    </p:tnLst>
-  </p:timing>
-</p:sld>
-</file>
-
-<file path=ppt/slides/slide31.xml><?xml version="1.0" encoding="utf-8"?>
-<p:sld xmlns:a="http://schemas.openxmlformats.org/drawingml/2006/main" xmlns:r="http://schemas.openxmlformats.org/officeDocument/2006/relationships" xmlns:p="http://schemas.openxmlformats.org/presentationml/2006/main">
-  <p:cSld>
-    <p:spTree>
-      <p:nvGrpSpPr>
-        <p:cNvPr id="1" name=""/>
-        <p:cNvGrpSpPr/>
-        <p:nvPr/>
-      </p:nvGrpSpPr>
-      <p:grpSpPr>
-        <a:xfrm>
-          <a:off x="0" y="0"/>
-          <a:ext cx="0" cy="0"/>
-          <a:chOff x="0" y="0"/>
-          <a:chExt cx="0" cy="0"/>
-        </a:xfrm>
-      </p:grpSpPr>
-      <p:sp>
-        <p:nvSpPr>
-          <p:cNvPr id="2" name="Título 1"/>
-          <p:cNvSpPr>
-            <a:spLocks noGrp="1"/>
-          </p:cNvSpPr>
-          <p:nvPr>
-            <p:ph type="title"/>
-          </p:nvPr>
-        </p:nvSpPr>
-        <p:spPr/>
-        <p:txBody>
-          <a:bodyPr>
-            <a:normAutofit/>
-          </a:bodyPr>
-          <a:lstStyle/>
-          <a:p>
-            <a:r>
-              <a:rPr lang="pt-BR" dirty="0" smtClean="0"/>
-              <a:t>Prática 7: display de 7 segmentos</a:t>
-            </a:r>
-            <a:endParaRPr lang="pt-BR" dirty="0"/>
-          </a:p>
-        </p:txBody>
-      </p:sp>
-      <p:pic>
-        <p:nvPicPr>
-          <p:cNvPr id="5" name="Imagem 4"/>
-          <p:cNvPicPr>
-            <a:picLocks noChangeAspect="1"/>
-          </p:cNvPicPr>
-          <p:nvPr/>
-        </p:nvPicPr>
-        <p:blipFill>
-          <a:blip r:embed="rId2">
-            <a:extLst>
-              <a:ext uri="{28A0092B-C50C-407E-A947-70E740481C1C}">
-                <a14:useLocalDpi xmlns:a14="http://schemas.microsoft.com/office/drawing/2010/main" val="0"/>
-              </a:ext>
-            </a:extLst>
-          </a:blip>
-          <a:stretch>
-            <a:fillRect/>
-          </a:stretch>
-        </p:blipFill>
-        <p:spPr>
-          <a:xfrm>
-            <a:off x="1629331" y="1345332"/>
-            <a:ext cx="5867400" cy="3876675"/>
-          </a:xfrm>
-          <a:prstGeom prst="rect">
-            <a:avLst/>
-          </a:prstGeom>
-        </p:spPr>
-      </p:pic>
-    </p:spTree>
-    <p:extLst>
-      <p:ext uri="{BB962C8B-B14F-4D97-AF65-F5344CB8AC3E}">
-        <p14:creationId xmlns:p14="http://schemas.microsoft.com/office/powerpoint/2010/main" val="2642927392"/>
-      </p:ext>
-    </p:extLst>
-  </p:cSld>
-  <p:clrMapOvr>
-    <a:masterClrMapping/>
-  </p:clrMapOvr>
-  <p:timing>
-    <p:tnLst>
-      <p:par>
-        <p:cTn id="1" dur="indefinite" restart="never" nodeType="tmRoot"/>
-      </p:par>
-    </p:tnLst>
-  </p:timing>
-</p:sld>
-</file>
-
-<file path=ppt/slides/slide32.xml><?xml version="1.0" encoding="utf-8"?>
-<p:sld xmlns:a="http://schemas.openxmlformats.org/drawingml/2006/main" xmlns:r="http://schemas.openxmlformats.org/officeDocument/2006/relationships" xmlns:p="http://schemas.openxmlformats.org/presentationml/2006/main">
-  <p:cSld>
-    <p:spTree>
-      <p:nvGrpSpPr>
-        <p:cNvPr id="1" name=""/>
-        <p:cNvGrpSpPr/>
-        <p:nvPr/>
-      </p:nvGrpSpPr>
-      <p:grpSpPr>
-        <a:xfrm>
-          <a:off x="0" y="0"/>
-          <a:ext cx="0" cy="0"/>
-          <a:chOff x="0" y="0"/>
-          <a:chExt cx="0" cy="0"/>
-        </a:xfrm>
-      </p:grpSpPr>
-      <p:sp>
-        <p:nvSpPr>
-          <p:cNvPr id="2" name="Título 1"/>
-          <p:cNvSpPr>
-            <a:spLocks noGrp="1"/>
-          </p:cNvSpPr>
-          <p:nvPr>
-            <p:ph type="title"/>
-          </p:nvPr>
-        </p:nvSpPr>
-        <p:spPr/>
-        <p:txBody>
-          <a:bodyPr>
-            <a:normAutofit/>
-          </a:bodyPr>
-          <a:lstStyle/>
-          <a:p>
-            <a:r>
-              <a:rPr lang="pt-BR" dirty="0" smtClean="0"/>
-              <a:t>Prática 7: display de 7 segmentos</a:t>
-            </a:r>
-            <a:endParaRPr lang="pt-BR" dirty="0"/>
-          </a:p>
-        </p:txBody>
-      </p:sp>
       <p:pic>
         <p:nvPicPr>
           <p:cNvPr id="2054" name="Picture 6"/>
@@ -11860,8 +11119,62 @@
         </p:blipFill>
         <p:spPr bwMode="auto">
           <a:xfrm>
-            <a:off x="2355850" y="1489348"/>
+            <a:off x="1547664" y="1489348"/>
             <a:ext cx="4432300" cy="3035300"/>
+          </a:xfrm>
+          <a:prstGeom prst="rect">
+            <a:avLst/>
+          </a:prstGeom>
+          <a:noFill/>
+          <a:ln>
+            <a:noFill/>
+          </a:ln>
+          <a:extLst>
+            <a:ext uri="{909E8E84-426E-40DD-AFC4-6F175D3DCCD1}">
+              <a14:hiddenFill xmlns:a14="http://schemas.microsoft.com/office/drawing/2010/main">
+                <a:solidFill>
+                  <a:schemeClr val="accent1"/>
+                </a:solidFill>
+              </a14:hiddenFill>
+            </a:ext>
+            <a:ext uri="{91240B29-F687-4F45-9708-019B960494DF}">
+              <a14:hiddenLine xmlns:a14="http://schemas.microsoft.com/office/drawing/2010/main" w="9525">
+                <a:solidFill>
+                  <a:schemeClr val="tx1"/>
+                </a:solidFill>
+                <a:miter lim="800000"/>
+                <a:headEnd/>
+                <a:tailEnd/>
+              </a14:hiddenLine>
+            </a:ext>
+          </a:extLst>
+        </p:spPr>
+      </p:pic>
+      <p:pic>
+        <p:nvPicPr>
+          <p:cNvPr id="4" name="Picture 2"/>
+          <p:cNvPicPr>
+            <a:picLocks noChangeAspect="1" noChangeArrowheads="1"/>
+          </p:cNvPicPr>
+          <p:nvPr/>
+        </p:nvPicPr>
+        <p:blipFill>
+          <a:blip r:embed="rId3">
+            <a:extLst>
+              <a:ext uri="{28A0092B-C50C-407E-A947-70E740481C1C}">
+                <a14:useLocalDpi xmlns:a14="http://schemas.microsoft.com/office/drawing/2010/main" val="0"/>
+              </a:ext>
+            </a:extLst>
+          </a:blip>
+          <a:srcRect/>
+          <a:stretch>
+            <a:fillRect/>
+          </a:stretch>
+        </p:blipFill>
+        <p:spPr bwMode="auto">
+          <a:xfrm>
+            <a:off x="6816192" y="1209388"/>
+            <a:ext cx="2115945" cy="4522314"/>
           </a:xfrm>
           <a:prstGeom prst="rect">
             <a:avLst/>
@@ -11911,7 +11224,7 @@
 </p:sld>
 </file>
 
-<file path=ppt/slides/slide33.xml><?xml version="1.0" encoding="utf-8"?>
+<file path=ppt/slides/slide31.xml><?xml version="1.0" encoding="utf-8"?>
 <p:sld xmlns:a="http://schemas.openxmlformats.org/drawingml/2006/main" xmlns:r="http://schemas.openxmlformats.org/officeDocument/2006/relationships" xmlns:p="http://schemas.openxmlformats.org/presentationml/2006/main">
   <p:cSld>
     <p:spTree>
@@ -12027,7 +11340,7 @@
 </p:sld>
 </file>
 
-<file path=ppt/slides/slide34.xml><?xml version="1.0" encoding="utf-8"?>
+<file path=ppt/slides/slide32.xml><?xml version="1.0" encoding="utf-8"?>
 <p:sld xmlns:a="http://schemas.openxmlformats.org/drawingml/2006/main" xmlns:r="http://schemas.openxmlformats.org/officeDocument/2006/relationships" xmlns:p="http://schemas.openxmlformats.org/presentationml/2006/main">
   <p:cSld>
     <p:spTree>
@@ -12202,7 +11515,7 @@
 </p:sld>
 </file>
 
-<file path=ppt/slides/slide35.xml><?xml version="1.0" encoding="utf-8"?>
+<file path=ppt/slides/slide33.xml><?xml version="1.0" encoding="utf-8"?>
 <p:sld xmlns:a="http://schemas.openxmlformats.org/drawingml/2006/main" xmlns:r="http://schemas.openxmlformats.org/officeDocument/2006/relationships" xmlns:p="http://schemas.openxmlformats.org/presentationml/2006/main">
   <p:cSld>
     <p:spTree>
@@ -12284,10 +11597,17 @@
   <p:clrMapOvr>
     <a:masterClrMapping/>
   </p:clrMapOvr>
+  <p:timing>
+    <p:tnLst>
+      <p:par>
+        <p:cTn id="1" dur="indefinite" restart="never" nodeType="tmRoot"/>
+      </p:par>
+    </p:tnLst>
+  </p:timing>
 </p:sld>
 </file>
 
-<file path=ppt/slides/slide36.xml><?xml version="1.0" encoding="utf-8"?>
+<file path=ppt/slides/slide34.xml><?xml version="1.0" encoding="utf-8"?>
 <p:sld xmlns:a="http://schemas.openxmlformats.org/drawingml/2006/main" xmlns:r="http://schemas.openxmlformats.org/officeDocument/2006/relationships" xmlns:p="http://schemas.openxmlformats.org/presentationml/2006/main">
   <p:cSld>
     <p:spTree>
@@ -12331,7 +11651,7 @@
       </p:sp>
       <p:pic>
         <p:nvPicPr>
-          <p:cNvPr id="5123" name="Picture 3"/>
+          <p:cNvPr id="1027" name="Picture 3"/>
           <p:cNvPicPr>
             <a:picLocks noChangeAspect="1" noChangeArrowheads="1"/>
           </p:cNvPicPr>
@@ -12352,8 +11672,62 @@
         </p:blipFill>
         <p:spPr bwMode="auto">
           <a:xfrm>
-            <a:off x="685800" y="2109788"/>
-            <a:ext cx="7772400" cy="1495425"/>
+            <a:off x="395536" y="1201316"/>
+            <a:ext cx="3733800" cy="3086100"/>
+          </a:xfrm>
+          <a:prstGeom prst="rect">
+            <a:avLst/>
+          </a:prstGeom>
+          <a:noFill/>
+          <a:ln>
+            <a:noFill/>
+          </a:ln>
+          <a:extLst>
+            <a:ext uri="{909E8E84-426E-40DD-AFC4-6F175D3DCCD1}">
+              <a14:hiddenFill xmlns:a14="http://schemas.microsoft.com/office/drawing/2010/main">
+                <a:solidFill>
+                  <a:schemeClr val="accent1"/>
+                </a:solidFill>
+              </a14:hiddenFill>
+            </a:ext>
+            <a:ext uri="{91240B29-F687-4F45-9708-019B960494DF}">
+              <a14:hiddenLine xmlns:a14="http://schemas.microsoft.com/office/drawing/2010/main" w="9525">
+                <a:solidFill>
+                  <a:schemeClr val="tx1"/>
+                </a:solidFill>
+                <a:miter lim="800000"/>
+                <a:headEnd/>
+                <a:tailEnd/>
+              </a14:hiddenLine>
+            </a:ext>
+          </a:extLst>
+        </p:spPr>
+      </p:pic>
+      <p:pic>
+        <p:nvPicPr>
+          <p:cNvPr id="1028" name="Picture 4"/>
+          <p:cNvPicPr>
+            <a:picLocks noChangeAspect="1" noChangeArrowheads="1"/>
+          </p:cNvPicPr>
+          <p:nvPr/>
+        </p:nvPicPr>
+        <p:blipFill>
+          <a:blip r:embed="rId3">
+            <a:extLst>
+              <a:ext uri="{28A0092B-C50C-407E-A947-70E740481C1C}">
+                <a14:useLocalDpi xmlns:a14="http://schemas.microsoft.com/office/drawing/2010/main" val="0"/>
+              </a:ext>
+            </a:extLst>
+          </a:blip>
+          <a:srcRect/>
+          <a:stretch>
+            <a:fillRect/>
+          </a:stretch>
+        </p:blipFill>
+        <p:spPr bwMode="auto">
+          <a:xfrm>
+            <a:off x="5219513" y="3308052"/>
+            <a:ext cx="3648075" cy="2390775"/>
           </a:xfrm>
           <a:prstGeom prst="rect">
             <a:avLst/>
@@ -12393,119 +11767,17 @@
   <p:clrMapOvr>
     <a:masterClrMapping/>
   </p:clrMapOvr>
+  <p:timing>
+    <p:tnLst>
+      <p:par>
+        <p:cTn id="1" dur="indefinite" restart="never" nodeType="tmRoot"/>
+      </p:par>
+    </p:tnLst>
+  </p:timing>
 </p:sld>
 </file>
 
-<file path=ppt/slides/slide37.xml><?xml version="1.0" encoding="utf-8"?>
-<p:sld xmlns:a="http://schemas.openxmlformats.org/drawingml/2006/main" xmlns:r="http://schemas.openxmlformats.org/officeDocument/2006/relationships" xmlns:p="http://schemas.openxmlformats.org/presentationml/2006/main">
-  <p:cSld>
-    <p:spTree>
-      <p:nvGrpSpPr>
-        <p:cNvPr id="1" name=""/>
-        <p:cNvGrpSpPr/>
-        <p:nvPr/>
-      </p:nvGrpSpPr>
-      <p:grpSpPr>
-        <a:xfrm>
-          <a:off x="0" y="0"/>
-          <a:ext cx="0" cy="0"/>
-          <a:chOff x="0" y="0"/>
-          <a:chExt cx="0" cy="0"/>
-        </a:xfrm>
-      </p:grpSpPr>
-      <p:sp>
-        <p:nvSpPr>
-          <p:cNvPr id="2" name="Título 1"/>
-          <p:cNvSpPr>
-            <a:spLocks noGrp="1"/>
-          </p:cNvSpPr>
-          <p:nvPr>
-            <p:ph type="title"/>
-          </p:nvPr>
-        </p:nvSpPr>
-        <p:spPr/>
-        <p:txBody>
-          <a:bodyPr>
-            <a:normAutofit/>
-          </a:bodyPr>
-          <a:lstStyle/>
-          <a:p>
-            <a:r>
-              <a:rPr lang="pt-BR" dirty="0" smtClean="0"/>
-              <a:t>Prática 8: joystick</a:t>
-            </a:r>
-            <a:endParaRPr lang="pt-BR" dirty="0"/>
-          </a:p>
-        </p:txBody>
-      </p:sp>
-      <p:pic>
-        <p:nvPicPr>
-          <p:cNvPr id="6147" name="Picture 3"/>
-          <p:cNvPicPr>
-            <a:picLocks noChangeAspect="1" noChangeArrowheads="1"/>
-          </p:cNvPicPr>
-          <p:nvPr/>
-        </p:nvPicPr>
-        <p:blipFill>
-          <a:blip r:embed="rId2">
-            <a:extLst>
-              <a:ext uri="{28A0092B-C50C-407E-A947-70E740481C1C}">
-                <a14:useLocalDpi xmlns:a14="http://schemas.microsoft.com/office/drawing/2010/main" val="0"/>
-              </a:ext>
-            </a:extLst>
-          </a:blip>
-          <a:srcRect/>
-          <a:stretch>
-            <a:fillRect/>
-          </a:stretch>
-        </p:blipFill>
-        <p:spPr bwMode="auto">
-          <a:xfrm>
-            <a:off x="985779" y="1201316"/>
-            <a:ext cx="7181850" cy="3914775"/>
-          </a:xfrm>
-          <a:prstGeom prst="rect">
-            <a:avLst/>
-          </a:prstGeom>
-          <a:noFill/>
-          <a:ln>
-            <a:noFill/>
-          </a:ln>
-          <a:extLst>
-            <a:ext uri="{909E8E84-426E-40DD-AFC4-6F175D3DCCD1}">
-              <a14:hiddenFill xmlns:a14="http://schemas.microsoft.com/office/drawing/2010/main">
-                <a:solidFill>
-                  <a:schemeClr val="accent1"/>
-                </a:solidFill>
-              </a14:hiddenFill>
-            </a:ext>
-            <a:ext uri="{91240B29-F687-4F45-9708-019B960494DF}">
-              <a14:hiddenLine xmlns:a14="http://schemas.microsoft.com/office/drawing/2010/main" w="9525">
-                <a:solidFill>
-                  <a:schemeClr val="tx1"/>
-                </a:solidFill>
-                <a:miter lim="800000"/>
-                <a:headEnd/>
-                <a:tailEnd/>
-              </a14:hiddenLine>
-            </a:ext>
-          </a:extLst>
-        </p:spPr>
-      </p:pic>
-    </p:spTree>
-    <p:extLst>
-      <p:ext uri="{BB962C8B-B14F-4D97-AF65-F5344CB8AC3E}">
-        <p14:creationId xmlns:p14="http://schemas.microsoft.com/office/powerpoint/2010/main" val="20678519"/>
-      </p:ext>
-    </p:extLst>
-  </p:cSld>
-  <p:clrMapOvr>
-    <a:masterClrMapping/>
-  </p:clrMapOvr>
-</p:sld>
-</file>
-
-<file path=ppt/slides/slide38.xml><?xml version="1.0" encoding="utf-8"?>
+<file path=ppt/slides/slide35.xml><?xml version="1.0" encoding="utf-8"?>
 <p:sld xmlns:a="http://schemas.openxmlformats.org/drawingml/2006/main" xmlns:r="http://schemas.openxmlformats.org/officeDocument/2006/relationships" xmlns:p="http://schemas.openxmlformats.org/presentationml/2006/main">
   <p:cSld>
     <p:spTree>

</xml_diff>